<commit_message>
Updated documentation to include comparator, led, and thermometer instruments.
</commit_message>
<xml_diff>
--- a/docs/HLD.pptx
+++ b/docs/HLD.pptx
@@ -6,7 +6,7 @@
     <p:sldMasterId id="2147483660" r:id="rId2"/>
   </p:sldMasterIdLst>
   <p:notesMasterIdLst>
-    <p:notesMasterId r:id="rId14"/>
+    <p:notesMasterId r:id="rId18"/>
   </p:notesMasterIdLst>
   <p:sldIdLst>
     <p:sldId id="256" r:id="rId3"/>
@@ -20,6 +20,10 @@
     <p:sldId id="263" r:id="rId11"/>
     <p:sldId id="266" r:id="rId12"/>
     <p:sldId id="267" r:id="rId13"/>
+    <p:sldId id="268" r:id="rId14"/>
+    <p:sldId id="269" r:id="rId15"/>
+    <p:sldId id="270" r:id="rId16"/>
+    <p:sldId id="271" r:id="rId17"/>
   </p:sldIdLst>
   <p:sldSz cx="9144000" cy="5143500" type="screen16x9"/>
   <p:notesSz cx="6858000" cy="9144000"/>
@@ -203,7 +207,7 @@
           <a:p>
             <a:fld id="{D6D22CB0-10DD-4055-8A4B-04E2D251AECD}" type="datetimeFigureOut">
               <a:rPr lang="en-US" smtClean="0"/>
-              <a:t>7/22/2019</a:t>
+              <a:t>7/27/2019</a:t>
             </a:fld>
             <a:endParaRPr lang="en-US"/>
           </a:p>
@@ -756,7 +760,7 @@
           <a:p>
             <a:fld id="{216C5678-EE20-4FA5-88E2-6E0BD67A2E26}" type="datetime1">
               <a:rPr lang="en-US" smtClean="0"/>
-              <a:t>7/22/2019</a:t>
+              <a:t>7/27/2019</a:t>
             </a:fld>
             <a:endParaRPr lang="en-US" dirty="0"/>
           </a:p>
@@ -926,7 +930,7 @@
           <a:p>
             <a:fld id="{EA051B39-B140-43FE-96DB-472A2B59CE7C}" type="datetime1">
               <a:rPr lang="en-US" smtClean="0"/>
-              <a:t>7/22/2019</a:t>
+              <a:t>7/27/2019</a:t>
             </a:fld>
             <a:endParaRPr lang="en-US"/>
           </a:p>
@@ -1110,7 +1114,7 @@
           <a:p>
             <a:fld id="{DA600BB2-27C5-458B-ABCE-839C88CF47CE}" type="datetime1">
               <a:rPr lang="en-US" smtClean="0"/>
-              <a:t>7/22/2019</a:t>
+              <a:t>7/27/2019</a:t>
             </a:fld>
             <a:endParaRPr lang="en-US"/>
           </a:p>
@@ -1361,7 +1365,7 @@
                 </a:solidFill>
               </a:rPr>
               <a:pPr/>
-              <a:t>7/22/2019</a:t>
+              <a:t>7/27/2019</a:t>
             </a:fld>
             <a:endParaRPr lang="en-US">
               <a:solidFill>
@@ -1561,7 +1565,7 @@
                 </a:solidFill>
               </a:rPr>
               <a:pPr/>
-              <a:t>7/22/2019</a:t>
+              <a:t>7/27/2019</a:t>
             </a:fld>
             <a:endParaRPr lang="en-US">
               <a:solidFill>
@@ -1838,7 +1842,7 @@
                 </a:solidFill>
               </a:rPr>
               <a:pPr/>
-              <a:t>7/22/2019</a:t>
+              <a:t>7/27/2019</a:t>
             </a:fld>
             <a:endParaRPr lang="en-US">
               <a:solidFill>
@@ -2155,7 +2159,7 @@
                 </a:solidFill>
               </a:rPr>
               <a:pPr/>
-              <a:t>7/22/2019</a:t>
+              <a:t>7/27/2019</a:t>
             </a:fld>
             <a:endParaRPr lang="en-US">
               <a:solidFill>
@@ -2606,7 +2610,7 @@
                 </a:solidFill>
               </a:rPr>
               <a:pPr/>
-              <a:t>7/22/2019</a:t>
+              <a:t>7/27/2019</a:t>
             </a:fld>
             <a:endParaRPr lang="en-US">
               <a:solidFill>
@@ -2755,7 +2759,7 @@
                 </a:solidFill>
               </a:rPr>
               <a:pPr/>
-              <a:t>7/22/2019</a:t>
+              <a:t>7/27/2019</a:t>
             </a:fld>
             <a:endParaRPr lang="en-US">
               <a:solidFill>
@@ -2882,7 +2886,7 @@
                 </a:solidFill>
               </a:rPr>
               <a:pPr/>
-              <a:t>7/22/2019</a:t>
+              <a:t>7/27/2019</a:t>
             </a:fld>
             <a:endParaRPr lang="en-US">
               <a:solidFill>
@@ -3189,7 +3193,7 @@
                 </a:solidFill>
               </a:rPr>
               <a:pPr/>
-              <a:t>7/22/2019</a:t>
+              <a:t>7/27/2019</a:t>
             </a:fld>
             <a:endParaRPr lang="en-US">
               <a:solidFill>
@@ -3401,7 +3405,7 @@
           <a:p>
             <a:fld id="{B11D738E-8962-435F-8C43-147B8DD7E819}" type="datetime1">
               <a:rPr lang="en-US" smtClean="0"/>
-              <a:t>7/22/2019</a:t>
+              <a:t>7/27/2019</a:t>
             </a:fld>
             <a:endParaRPr lang="en-US"/>
           </a:p>
@@ -3669,7 +3673,7 @@
                 </a:solidFill>
               </a:rPr>
               <a:pPr/>
-              <a:t>7/22/2019</a:t>
+              <a:t>7/27/2019</a:t>
             </a:fld>
             <a:endParaRPr lang="en-US">
               <a:solidFill>
@@ -3869,7 +3873,7 @@
                 </a:solidFill>
               </a:rPr>
               <a:pPr/>
-              <a:t>7/22/2019</a:t>
+              <a:t>7/27/2019</a:t>
             </a:fld>
             <a:endParaRPr lang="en-US">
               <a:solidFill>
@@ -4079,7 +4083,7 @@
                 </a:solidFill>
               </a:rPr>
               <a:pPr/>
-              <a:t>7/22/2019</a:t>
+              <a:t>7/27/2019</a:t>
             </a:fld>
             <a:endParaRPr lang="en-US">
               <a:solidFill>
@@ -4371,7 +4375,7 @@
           <a:p>
             <a:fld id="{09CAEA93-55E7-4DA9-90C2-089A26EEFEC4}" type="datetime1">
               <a:rPr lang="en-US" smtClean="0"/>
-              <a:t>7/22/2019</a:t>
+              <a:t>7/27/2019</a:t>
             </a:fld>
             <a:endParaRPr lang="en-US"/>
           </a:p>
@@ -4724,7 +4728,7 @@
           <a:p>
             <a:fld id="{E34CF3C7-6809-4F39-BD67-A75817BDDE0A}" type="datetime1">
               <a:rPr lang="en-US" smtClean="0"/>
-              <a:t>7/22/2019</a:t>
+              <a:t>7/27/2019</a:t>
             </a:fld>
             <a:endParaRPr lang="en-US"/>
           </a:p>
@@ -5041,7 +5045,7 @@
           <a:p>
             <a:fld id="{F7EAEB24-CE78-465C-A726-91D0868FA48F}" type="datetime1">
               <a:rPr lang="en-US" smtClean="0"/>
-              <a:t>7/22/2019</a:t>
+              <a:t>7/27/2019</a:t>
             </a:fld>
             <a:endParaRPr lang="en-US"/>
           </a:p>
@@ -5277,7 +5281,7 @@
           <a:p>
             <a:fld id="{40BAADF0-1749-4E8B-9691-B44A5F8C0895}" type="datetime1">
               <a:rPr lang="en-US" smtClean="0"/>
-              <a:t>7/22/2019</a:t>
+              <a:t>7/27/2019</a:t>
             </a:fld>
             <a:endParaRPr lang="en-US"/>
           </a:p>
@@ -5376,7 +5380,7 @@
           <a:p>
             <a:fld id="{A8AF628A-A867-4937-BBE5-207DB6F9C51A}" type="datetime1">
               <a:rPr lang="en-US" smtClean="0"/>
-              <a:t>7/22/2019</a:t>
+              <a:t>7/27/2019</a:t>
             </a:fld>
             <a:endParaRPr lang="en-US"/>
           </a:p>
@@ -5673,7 +5677,7 @@
           <a:p>
             <a:fld id="{118BBB94-68E6-4675-A946-F1C5994EDBD7}" type="datetime1">
               <a:rPr lang="en-US" smtClean="0"/>
-              <a:t>7/22/2019</a:t>
+              <a:t>7/27/2019</a:t>
             </a:fld>
             <a:endParaRPr lang="en-US"/>
           </a:p>
@@ -5951,7 +5955,7 @@
           <a:p>
             <a:fld id="{DC3B8377-21E3-4835-B75D-4E2847E2750F}" type="datetime1">
               <a:rPr lang="en-US" smtClean="0"/>
-              <a:t>7/22/2019</a:t>
+              <a:t>7/27/2019</a:t>
             </a:fld>
             <a:endParaRPr lang="en-US"/>
           </a:p>
@@ -6169,7 +6173,7 @@
           <a:p>
             <a:fld id="{B0C4986D-6BE9-4264-908F-02DB36FD8D6C}" type="datetime1">
               <a:rPr lang="en-US" smtClean="0"/>
-              <a:t>7/22/2019</a:t>
+              <a:t>7/27/2019</a:t>
             </a:fld>
             <a:endParaRPr lang="en-US" dirty="0"/>
           </a:p>
@@ -6856,7 +6860,7 @@
                 </a:solidFill>
               </a:rPr>
               <a:pPr defTabSz="342892"/>
-              <a:t>7/22/2019</a:t>
+              <a:t>7/27/2019</a:t>
             </a:fld>
             <a:endParaRPr lang="en-US">
               <a:solidFill>
@@ -7335,7 +7339,7 @@
           <a:p>
             <a:fld id="{216C5678-EE20-4FA5-88E2-6E0BD67A2E26}" type="datetime1">
               <a:rPr lang="en-US" smtClean="0"/>
-              <a:t>7/22/2019</a:t>
+              <a:t>7/27/2019</a:t>
             </a:fld>
             <a:endParaRPr lang="en-US" dirty="0"/>
           </a:p>
@@ -7480,7 +7484,7 @@
           <a:p>
             <a:fld id="{B11D738E-8962-435F-8C43-147B8DD7E819}" type="datetime1">
               <a:rPr lang="en-US" smtClean="0"/>
-              <a:t>7/22/2019</a:t>
+              <a:t>7/27/2019</a:t>
             </a:fld>
             <a:endParaRPr lang="en-US"/>
           </a:p>
@@ -7603,7 +7607,7 @@
           <a:p>
             <a:fld id="{09CAEA93-55E7-4DA9-90C2-089A26EEFEC4}" type="datetime1">
               <a:rPr lang="en-US" smtClean="0"/>
-              <a:t>7/22/2019</a:t>
+              <a:t>7/27/2019</a:t>
             </a:fld>
             <a:endParaRPr lang="en-US"/>
           </a:p>
@@ -8130,6 +8134,2535 @@
     <p:extLst>
       <p:ext uri="{BB962C8B-B14F-4D97-AF65-F5344CB8AC3E}">
         <p14:creationId xmlns:p14="http://schemas.microsoft.com/office/powerpoint/2010/main" val="3146610386"/>
+      </p:ext>
+    </p:extLst>
+  </p:cSld>
+  <p:clrMapOvr>
+    <a:masterClrMapping/>
+  </p:clrMapOvr>
+</p:sld>
+</file>
+
+<file path=ppt/slides/slide12.xml><?xml version="1.0" encoding="utf-8"?>
+<p:sld xmlns:a="http://schemas.openxmlformats.org/drawingml/2006/main" xmlns:r="http://schemas.openxmlformats.org/officeDocument/2006/relationships" xmlns:p="http://schemas.openxmlformats.org/presentationml/2006/main">
+  <p:cSld>
+    <p:spTree>
+      <p:nvGrpSpPr>
+        <p:cNvPr id="1" name=""/>
+        <p:cNvGrpSpPr/>
+        <p:nvPr/>
+      </p:nvGrpSpPr>
+      <p:grpSpPr>
+        <a:xfrm>
+          <a:off x="0" y="0"/>
+          <a:ext cx="0" cy="0"/>
+          <a:chOff x="0" y="0"/>
+          <a:chExt cx="0" cy="0"/>
+        </a:xfrm>
+      </p:grpSpPr>
+      <p:sp>
+        <p:nvSpPr>
+          <p:cNvPr id="6" name="Title 5"/>
+          <p:cNvSpPr>
+            <a:spLocks noGrp="1"/>
+          </p:cNvSpPr>
+          <p:nvPr>
+            <p:ph type="title"/>
+          </p:nvPr>
+        </p:nvSpPr>
+        <p:spPr/>
+        <p:txBody>
+          <a:bodyPr/>
+          <a:lstStyle/>
+          <a:p>
+            <a:r>
+              <a:rPr lang="en-US" dirty="0" smtClean="0"/>
+              <a:t>Thermometer Instrument</a:t>
+            </a:r>
+            <a:endParaRPr lang="en-US" dirty="0"/>
+          </a:p>
+        </p:txBody>
+      </p:sp>
+      <p:sp>
+        <p:nvSpPr>
+          <p:cNvPr id="7" name="Text Placeholder 6"/>
+          <p:cNvSpPr>
+            <a:spLocks noGrp="1"/>
+          </p:cNvSpPr>
+          <p:nvPr>
+            <p:ph type="body" idx="1"/>
+          </p:nvPr>
+        </p:nvSpPr>
+        <p:spPr/>
+        <p:txBody>
+          <a:bodyPr/>
+          <a:lstStyle/>
+          <a:p>
+            <a:endParaRPr lang="en-US"/>
+          </a:p>
+        </p:txBody>
+      </p:sp>
+      <p:sp>
+        <p:nvSpPr>
+          <p:cNvPr id="3" name="Date Placeholder 2"/>
+          <p:cNvSpPr>
+            <a:spLocks noGrp="1"/>
+          </p:cNvSpPr>
+          <p:nvPr>
+            <p:ph type="dt" sz="half" idx="10"/>
+          </p:nvPr>
+        </p:nvSpPr>
+        <p:spPr/>
+        <p:txBody>
+          <a:bodyPr/>
+          <a:lstStyle/>
+          <a:p>
+            <a:fld id="{40BAADF0-1749-4E8B-9691-B44A5F8C0895}" type="datetime1">
+              <a:rPr lang="en-US" smtClean="0"/>
+              <a:t>7/27/2019</a:t>
+            </a:fld>
+            <a:endParaRPr lang="en-US"/>
+          </a:p>
+        </p:txBody>
+      </p:sp>
+      <p:sp>
+        <p:nvSpPr>
+          <p:cNvPr id="4" name="Footer Placeholder 3"/>
+          <p:cNvSpPr>
+            <a:spLocks noGrp="1"/>
+          </p:cNvSpPr>
+          <p:nvPr>
+            <p:ph type="ftr" sz="quarter" idx="11"/>
+          </p:nvPr>
+        </p:nvSpPr>
+        <p:spPr/>
+        <p:txBody>
+          <a:bodyPr/>
+          <a:lstStyle/>
+          <a:p>
+            <a:r>
+              <a:rPr lang="en-US" smtClean="0"/>
+              <a:t>Hardware Simulation and Software Models for P1687.1 and P2654</a:t>
+            </a:r>
+            <a:endParaRPr lang="en-US" dirty="0"/>
+          </a:p>
+        </p:txBody>
+      </p:sp>
+      <p:sp>
+        <p:nvSpPr>
+          <p:cNvPr id="5" name="Slide Number Placeholder 4"/>
+          <p:cNvSpPr>
+            <a:spLocks noGrp="1"/>
+          </p:cNvSpPr>
+          <p:nvPr>
+            <p:ph type="sldNum" sz="quarter" idx="12"/>
+          </p:nvPr>
+        </p:nvSpPr>
+        <p:spPr/>
+        <p:txBody>
+          <a:bodyPr/>
+          <a:lstStyle/>
+          <a:p>
+            <a:fld id="{BA9B540C-44DA-4F69-89C9-7C84606640D3}" type="slidenum">
+              <a:rPr lang="en-US" smtClean="0"/>
+              <a:pPr/>
+              <a:t>12</a:t>
+            </a:fld>
+            <a:endParaRPr lang="en-US"/>
+          </a:p>
+        </p:txBody>
+      </p:sp>
+    </p:spTree>
+    <p:extLst>
+      <p:ext uri="{BB962C8B-B14F-4D97-AF65-F5344CB8AC3E}">
+        <p14:creationId xmlns:p14="http://schemas.microsoft.com/office/powerpoint/2010/main" val="1593776502"/>
+      </p:ext>
+    </p:extLst>
+  </p:cSld>
+  <p:clrMapOvr>
+    <a:masterClrMapping/>
+  </p:clrMapOvr>
+</p:sld>
+</file>
+
+<file path=ppt/slides/slide13.xml><?xml version="1.0" encoding="utf-8"?>
+<p:sld xmlns:a="http://schemas.openxmlformats.org/drawingml/2006/main" xmlns:r="http://schemas.openxmlformats.org/officeDocument/2006/relationships" xmlns:p="http://schemas.openxmlformats.org/presentationml/2006/main">
+  <p:cSld>
+    <p:spTree>
+      <p:nvGrpSpPr>
+        <p:cNvPr id="1" name=""/>
+        <p:cNvGrpSpPr/>
+        <p:nvPr/>
+      </p:nvGrpSpPr>
+      <p:grpSpPr>
+        <a:xfrm>
+          <a:off x="0" y="0"/>
+          <a:ext cx="0" cy="0"/>
+          <a:chOff x="0" y="0"/>
+          <a:chExt cx="0" cy="0"/>
+        </a:xfrm>
+      </p:grpSpPr>
+      <p:sp>
+        <p:nvSpPr>
+          <p:cNvPr id="7" name="Title 6"/>
+          <p:cNvSpPr>
+            <a:spLocks noGrp="1"/>
+          </p:cNvSpPr>
+          <p:nvPr>
+            <p:ph type="title"/>
+          </p:nvPr>
+        </p:nvSpPr>
+        <p:spPr/>
+        <p:txBody>
+          <a:bodyPr/>
+          <a:lstStyle/>
+          <a:p>
+            <a:r>
+              <a:rPr lang="en-US" sz="3600" dirty="0" smtClean="0"/>
+              <a:t>Thermometer Simulated Instrument</a:t>
+            </a:r>
+            <a:endParaRPr lang="en-US" sz="3600" dirty="0"/>
+          </a:p>
+        </p:txBody>
+      </p:sp>
+      <p:sp>
+        <p:nvSpPr>
+          <p:cNvPr id="4" name="Date Placeholder 3"/>
+          <p:cNvSpPr>
+            <a:spLocks noGrp="1"/>
+          </p:cNvSpPr>
+          <p:nvPr>
+            <p:ph type="dt" sz="half" idx="10"/>
+          </p:nvPr>
+        </p:nvSpPr>
+        <p:spPr/>
+        <p:txBody>
+          <a:bodyPr/>
+          <a:lstStyle/>
+          <a:p>
+            <a:fld id="{09CAEA93-55E7-4DA9-90C2-089A26EEFEC4}" type="datetime1">
+              <a:rPr lang="en-US" smtClean="0"/>
+              <a:t>7/27/2019</a:t>
+            </a:fld>
+            <a:endParaRPr lang="en-US"/>
+          </a:p>
+        </p:txBody>
+      </p:sp>
+      <p:sp>
+        <p:nvSpPr>
+          <p:cNvPr id="5" name="Footer Placeholder 4"/>
+          <p:cNvSpPr>
+            <a:spLocks noGrp="1"/>
+          </p:cNvSpPr>
+          <p:nvPr>
+            <p:ph type="ftr" sz="quarter" idx="11"/>
+          </p:nvPr>
+        </p:nvSpPr>
+        <p:spPr/>
+        <p:txBody>
+          <a:bodyPr/>
+          <a:lstStyle/>
+          <a:p>
+            <a:r>
+              <a:rPr lang="en-US" smtClean="0"/>
+              <a:t>Footer Text</a:t>
+            </a:r>
+            <a:endParaRPr lang="en-US"/>
+          </a:p>
+        </p:txBody>
+      </p:sp>
+      <p:sp>
+        <p:nvSpPr>
+          <p:cNvPr id="6" name="Slide Number Placeholder 5"/>
+          <p:cNvSpPr>
+            <a:spLocks noGrp="1"/>
+          </p:cNvSpPr>
+          <p:nvPr>
+            <p:ph type="sldNum" sz="quarter" idx="12"/>
+          </p:nvPr>
+        </p:nvSpPr>
+        <p:spPr/>
+        <p:txBody>
+          <a:bodyPr/>
+          <a:lstStyle/>
+          <a:p>
+            <a:fld id="{BA9B540C-44DA-4F69-89C9-7C84606640D3}" type="slidenum">
+              <a:rPr lang="en-US" smtClean="0"/>
+              <a:pPr/>
+              <a:t>13</a:t>
+            </a:fld>
+            <a:endParaRPr lang="en-US"/>
+          </a:p>
+        </p:txBody>
+      </p:sp>
+      <p:sp>
+        <p:nvSpPr>
+          <p:cNvPr id="8" name="Rectangle 7"/>
+          <p:cNvSpPr/>
+          <p:nvPr/>
+        </p:nvSpPr>
+        <p:spPr>
+          <a:xfrm>
+            <a:off x="3581400" y="1733550"/>
+            <a:ext cx="3200400" cy="2895600"/>
+          </a:xfrm>
+          <a:prstGeom prst="rect">
+            <a:avLst/>
+          </a:prstGeom>
+          <a:solidFill>
+            <a:schemeClr val="accent3">
+              <a:lumMod val="40000"/>
+              <a:lumOff val="60000"/>
+            </a:schemeClr>
+          </a:solidFill>
+        </p:spPr>
+        <p:style>
+          <a:lnRef idx="2">
+            <a:schemeClr val="accent1">
+              <a:shade val="50000"/>
+            </a:schemeClr>
+          </a:lnRef>
+          <a:fillRef idx="1">
+            <a:schemeClr val="accent1"/>
+          </a:fillRef>
+          <a:effectRef idx="0">
+            <a:schemeClr val="accent1"/>
+          </a:effectRef>
+          <a:fontRef idx="minor">
+            <a:schemeClr val="lt1"/>
+          </a:fontRef>
+        </p:style>
+        <p:txBody>
+          <a:bodyPr rtlCol="0" anchor="ctr"/>
+          <a:lstStyle/>
+          <a:p>
+            <a:pPr algn="ctr"/>
+            <a:endParaRPr lang="en-US"/>
+          </a:p>
+        </p:txBody>
+      </p:sp>
+      <p:sp>
+        <p:nvSpPr>
+          <p:cNvPr id="9" name="Right Arrow 8"/>
+          <p:cNvSpPr/>
+          <p:nvPr/>
+        </p:nvSpPr>
+        <p:spPr>
+          <a:xfrm>
+            <a:off x="6781800" y="2973973"/>
+            <a:ext cx="990600" cy="304800"/>
+          </a:xfrm>
+          <a:prstGeom prst="rightArrow">
+            <a:avLst/>
+          </a:prstGeom>
+        </p:spPr>
+        <p:style>
+          <a:lnRef idx="2">
+            <a:schemeClr val="accent1">
+              <a:shade val="50000"/>
+            </a:schemeClr>
+          </a:lnRef>
+          <a:fillRef idx="1">
+            <a:schemeClr val="accent1"/>
+          </a:fillRef>
+          <a:effectRef idx="0">
+            <a:schemeClr val="accent1"/>
+          </a:effectRef>
+          <a:fontRef idx="minor">
+            <a:schemeClr val="lt1"/>
+          </a:fontRef>
+        </p:style>
+        <p:txBody>
+          <a:bodyPr rtlCol="0" anchor="ctr"/>
+          <a:lstStyle/>
+          <a:p>
+            <a:pPr algn="ctr"/>
+            <a:endParaRPr lang="en-US"/>
+          </a:p>
+        </p:txBody>
+      </p:sp>
+      <p:sp>
+        <p:nvSpPr>
+          <p:cNvPr id="10" name="Right Arrow 9"/>
+          <p:cNvSpPr/>
+          <p:nvPr/>
+        </p:nvSpPr>
+        <p:spPr>
+          <a:xfrm>
+            <a:off x="2667000" y="2495550"/>
+            <a:ext cx="914400" cy="228600"/>
+          </a:xfrm>
+          <a:prstGeom prst="rightArrow">
+            <a:avLst/>
+          </a:prstGeom>
+        </p:spPr>
+        <p:style>
+          <a:lnRef idx="2">
+            <a:schemeClr val="accent1">
+              <a:shade val="50000"/>
+            </a:schemeClr>
+          </a:lnRef>
+          <a:fillRef idx="1">
+            <a:schemeClr val="accent1"/>
+          </a:fillRef>
+          <a:effectRef idx="0">
+            <a:schemeClr val="accent1"/>
+          </a:effectRef>
+          <a:fontRef idx="minor">
+            <a:schemeClr val="lt1"/>
+          </a:fontRef>
+        </p:style>
+        <p:txBody>
+          <a:bodyPr rtlCol="0" anchor="ctr"/>
+          <a:lstStyle/>
+          <a:p>
+            <a:pPr algn="ctr"/>
+            <a:endParaRPr lang="en-US"/>
+          </a:p>
+        </p:txBody>
+      </p:sp>
+      <p:sp>
+        <p:nvSpPr>
+          <p:cNvPr id="11" name="TextBox 10"/>
+          <p:cNvSpPr txBox="1"/>
+          <p:nvPr/>
+        </p:nvSpPr>
+        <p:spPr>
+          <a:xfrm>
+            <a:off x="1943100" y="1733550"/>
+            <a:ext cx="781051" cy="307777"/>
+          </a:xfrm>
+          <a:prstGeom prst="rect">
+            <a:avLst/>
+          </a:prstGeom>
+          <a:noFill/>
+        </p:spPr>
+        <p:txBody>
+          <a:bodyPr wrap="square" rtlCol="0">
+            <a:spAutoFit/>
+          </a:bodyPr>
+          <a:lstStyle/>
+          <a:p>
+            <a:pPr algn="r"/>
+            <a:r>
+              <a:rPr lang="en-US" sz="1400" dirty="0" smtClean="0"/>
+              <a:t>parent</a:t>
+            </a:r>
+            <a:endParaRPr lang="en-US" sz="1400" dirty="0"/>
+          </a:p>
+        </p:txBody>
+      </p:sp>
+      <p:sp>
+        <p:nvSpPr>
+          <p:cNvPr id="12" name="TextBox 11"/>
+          <p:cNvSpPr txBox="1"/>
+          <p:nvPr/>
+        </p:nvSpPr>
+        <p:spPr>
+          <a:xfrm>
+            <a:off x="1924050" y="1999007"/>
+            <a:ext cx="781051" cy="307777"/>
+          </a:xfrm>
+          <a:prstGeom prst="rect">
+            <a:avLst/>
+          </a:prstGeom>
+          <a:noFill/>
+        </p:spPr>
+        <p:txBody>
+          <a:bodyPr wrap="square" rtlCol="0">
+            <a:spAutoFit/>
+          </a:bodyPr>
+          <a:lstStyle/>
+          <a:p>
+            <a:pPr algn="r"/>
+            <a:r>
+              <a:rPr lang="en-US" sz="1400" dirty="0" smtClean="0"/>
+              <a:t>name</a:t>
+            </a:r>
+            <a:endParaRPr lang="en-US" sz="1400" dirty="0"/>
+          </a:p>
+        </p:txBody>
+      </p:sp>
+      <p:sp>
+        <p:nvSpPr>
+          <p:cNvPr id="13" name="Left Brace 12"/>
+          <p:cNvSpPr/>
+          <p:nvPr/>
+        </p:nvSpPr>
+        <p:spPr>
+          <a:xfrm>
+            <a:off x="1943100" y="1733550"/>
+            <a:ext cx="180975" cy="574980"/>
+          </a:xfrm>
+          <a:prstGeom prst="leftBrace">
+            <a:avLst/>
+          </a:prstGeom>
+        </p:spPr>
+        <p:style>
+          <a:lnRef idx="1">
+            <a:schemeClr val="accent1"/>
+          </a:lnRef>
+          <a:fillRef idx="0">
+            <a:schemeClr val="accent1"/>
+          </a:fillRef>
+          <a:effectRef idx="0">
+            <a:schemeClr val="accent1"/>
+          </a:effectRef>
+          <a:fontRef idx="minor">
+            <a:schemeClr val="tx1"/>
+          </a:fontRef>
+        </p:style>
+        <p:txBody>
+          <a:bodyPr rtlCol="0" anchor="ctr"/>
+          <a:lstStyle/>
+          <a:p>
+            <a:pPr algn="ctr"/>
+            <a:endParaRPr lang="en-US"/>
+          </a:p>
+        </p:txBody>
+      </p:sp>
+      <p:sp>
+        <p:nvSpPr>
+          <p:cNvPr id="14" name="TextBox 13"/>
+          <p:cNvSpPr txBox="1"/>
+          <p:nvPr/>
+        </p:nvSpPr>
+        <p:spPr>
+          <a:xfrm>
+            <a:off x="1066800" y="1841077"/>
+            <a:ext cx="857250" cy="369332"/>
+          </a:xfrm>
+          <a:prstGeom prst="rect">
+            <a:avLst/>
+          </a:prstGeom>
+          <a:noFill/>
+        </p:spPr>
+        <p:txBody>
+          <a:bodyPr wrap="square" rtlCol="0">
+            <a:spAutoFit/>
+          </a:bodyPr>
+          <a:lstStyle/>
+          <a:p>
+            <a:pPr algn="r"/>
+            <a:r>
+              <a:rPr lang="en-US" sz="900" dirty="0" smtClean="0"/>
+              <a:t>For </a:t>
+            </a:r>
+            <a:r>
+              <a:rPr lang="en-US" sz="900" dirty="0" err="1" smtClean="0"/>
+              <a:t>myHDL</a:t>
+            </a:r>
+            <a:r>
+              <a:rPr lang="en-US" sz="900" dirty="0" smtClean="0"/>
+              <a:t> debugging</a:t>
+            </a:r>
+            <a:endParaRPr lang="en-US" sz="900" dirty="0"/>
+          </a:p>
+        </p:txBody>
+      </p:sp>
+      <p:sp>
+        <p:nvSpPr>
+          <p:cNvPr id="15" name="Right Arrow 14"/>
+          <p:cNvSpPr/>
+          <p:nvPr/>
+        </p:nvSpPr>
+        <p:spPr>
+          <a:xfrm>
+            <a:off x="2714626" y="2062407"/>
+            <a:ext cx="876300" cy="180975"/>
+          </a:xfrm>
+          <a:prstGeom prst="rightArrow">
+            <a:avLst/>
+          </a:prstGeom>
+          <a:solidFill>
+            <a:schemeClr val="accent5">
+              <a:lumMod val="40000"/>
+              <a:lumOff val="60000"/>
+            </a:schemeClr>
+          </a:solidFill>
+        </p:spPr>
+        <p:style>
+          <a:lnRef idx="2">
+            <a:schemeClr val="accent1">
+              <a:shade val="50000"/>
+            </a:schemeClr>
+          </a:lnRef>
+          <a:fillRef idx="1">
+            <a:schemeClr val="accent1"/>
+          </a:fillRef>
+          <a:effectRef idx="0">
+            <a:schemeClr val="accent1"/>
+          </a:effectRef>
+          <a:fontRef idx="minor">
+            <a:schemeClr val="lt1"/>
+          </a:fontRef>
+        </p:style>
+        <p:txBody>
+          <a:bodyPr rtlCol="0" anchor="ctr"/>
+          <a:lstStyle/>
+          <a:p>
+            <a:pPr algn="ctr"/>
+            <a:endParaRPr lang="en-US"/>
+          </a:p>
+        </p:txBody>
+      </p:sp>
+      <p:sp>
+        <p:nvSpPr>
+          <p:cNvPr id="16" name="Right Arrow 15"/>
+          <p:cNvSpPr/>
+          <p:nvPr/>
+        </p:nvSpPr>
+        <p:spPr>
+          <a:xfrm>
+            <a:off x="2705101" y="1796950"/>
+            <a:ext cx="876300" cy="180975"/>
+          </a:xfrm>
+          <a:prstGeom prst="rightArrow">
+            <a:avLst/>
+          </a:prstGeom>
+          <a:solidFill>
+            <a:schemeClr val="accent5">
+              <a:lumMod val="40000"/>
+              <a:lumOff val="60000"/>
+            </a:schemeClr>
+          </a:solidFill>
+        </p:spPr>
+        <p:style>
+          <a:lnRef idx="2">
+            <a:schemeClr val="accent1">
+              <a:shade val="50000"/>
+            </a:schemeClr>
+          </a:lnRef>
+          <a:fillRef idx="1">
+            <a:schemeClr val="accent1"/>
+          </a:fillRef>
+          <a:effectRef idx="0">
+            <a:schemeClr val="accent1"/>
+          </a:effectRef>
+          <a:fontRef idx="minor">
+            <a:schemeClr val="lt1"/>
+          </a:fontRef>
+        </p:style>
+        <p:txBody>
+          <a:bodyPr rtlCol="0" anchor="ctr"/>
+          <a:lstStyle/>
+          <a:p>
+            <a:pPr algn="ctr"/>
+            <a:endParaRPr lang="en-US"/>
+          </a:p>
+        </p:txBody>
+      </p:sp>
+      <p:sp>
+        <p:nvSpPr>
+          <p:cNvPr id="17" name="Right Arrow 16"/>
+          <p:cNvSpPr/>
+          <p:nvPr/>
+        </p:nvSpPr>
+        <p:spPr>
+          <a:xfrm>
+            <a:off x="2667000" y="2800350"/>
+            <a:ext cx="914400" cy="228600"/>
+          </a:xfrm>
+          <a:prstGeom prst="rightArrow">
+            <a:avLst/>
+          </a:prstGeom>
+        </p:spPr>
+        <p:style>
+          <a:lnRef idx="2">
+            <a:schemeClr val="accent1">
+              <a:shade val="50000"/>
+            </a:schemeClr>
+          </a:lnRef>
+          <a:fillRef idx="1">
+            <a:schemeClr val="accent1"/>
+          </a:fillRef>
+          <a:effectRef idx="0">
+            <a:schemeClr val="accent1"/>
+          </a:effectRef>
+          <a:fontRef idx="minor">
+            <a:schemeClr val="lt1"/>
+          </a:fontRef>
+        </p:style>
+        <p:txBody>
+          <a:bodyPr rtlCol="0" anchor="ctr"/>
+          <a:lstStyle/>
+          <a:p>
+            <a:pPr algn="ctr"/>
+            <a:endParaRPr lang="en-US"/>
+          </a:p>
+        </p:txBody>
+      </p:sp>
+      <p:sp>
+        <p:nvSpPr>
+          <p:cNvPr id="18" name="Right Arrow 17"/>
+          <p:cNvSpPr/>
+          <p:nvPr/>
+        </p:nvSpPr>
+        <p:spPr>
+          <a:xfrm>
+            <a:off x="2667000" y="3105150"/>
+            <a:ext cx="914400" cy="228600"/>
+          </a:xfrm>
+          <a:prstGeom prst="rightArrow">
+            <a:avLst/>
+          </a:prstGeom>
+        </p:spPr>
+        <p:style>
+          <a:lnRef idx="2">
+            <a:schemeClr val="accent1">
+              <a:shade val="50000"/>
+            </a:schemeClr>
+          </a:lnRef>
+          <a:fillRef idx="1">
+            <a:schemeClr val="accent1"/>
+          </a:fillRef>
+          <a:effectRef idx="0">
+            <a:schemeClr val="accent1"/>
+          </a:effectRef>
+          <a:fontRef idx="minor">
+            <a:schemeClr val="lt1"/>
+          </a:fontRef>
+        </p:style>
+        <p:txBody>
+          <a:bodyPr rtlCol="0" anchor="ctr"/>
+          <a:lstStyle/>
+          <a:p>
+            <a:pPr algn="ctr"/>
+            <a:endParaRPr lang="en-US"/>
+          </a:p>
+        </p:txBody>
+      </p:sp>
+      <p:sp>
+        <p:nvSpPr>
+          <p:cNvPr id="19" name="Right Arrow 18"/>
+          <p:cNvSpPr/>
+          <p:nvPr/>
+        </p:nvSpPr>
+        <p:spPr>
+          <a:xfrm>
+            <a:off x="2667000" y="3409950"/>
+            <a:ext cx="914400" cy="228600"/>
+          </a:xfrm>
+          <a:prstGeom prst="rightArrow">
+            <a:avLst/>
+          </a:prstGeom>
+        </p:spPr>
+        <p:style>
+          <a:lnRef idx="2">
+            <a:schemeClr val="accent1">
+              <a:shade val="50000"/>
+            </a:schemeClr>
+          </a:lnRef>
+          <a:fillRef idx="1">
+            <a:schemeClr val="accent1"/>
+          </a:fillRef>
+          <a:effectRef idx="0">
+            <a:schemeClr val="accent1"/>
+          </a:effectRef>
+          <a:fontRef idx="minor">
+            <a:schemeClr val="lt1"/>
+          </a:fontRef>
+        </p:style>
+        <p:txBody>
+          <a:bodyPr rtlCol="0" anchor="ctr"/>
+          <a:lstStyle/>
+          <a:p>
+            <a:pPr algn="ctr"/>
+            <a:endParaRPr lang="en-US"/>
+          </a:p>
+        </p:txBody>
+      </p:sp>
+      <p:sp>
+        <p:nvSpPr>
+          <p:cNvPr id="20" name="Right Arrow 19"/>
+          <p:cNvSpPr/>
+          <p:nvPr/>
+        </p:nvSpPr>
+        <p:spPr>
+          <a:xfrm>
+            <a:off x="2667000" y="3714750"/>
+            <a:ext cx="914400" cy="228600"/>
+          </a:xfrm>
+          <a:prstGeom prst="rightArrow">
+            <a:avLst/>
+          </a:prstGeom>
+        </p:spPr>
+        <p:style>
+          <a:lnRef idx="2">
+            <a:schemeClr val="accent1">
+              <a:shade val="50000"/>
+            </a:schemeClr>
+          </a:lnRef>
+          <a:fillRef idx="1">
+            <a:schemeClr val="accent1"/>
+          </a:fillRef>
+          <a:effectRef idx="0">
+            <a:schemeClr val="accent1"/>
+          </a:effectRef>
+          <a:fontRef idx="minor">
+            <a:schemeClr val="lt1"/>
+          </a:fontRef>
+        </p:style>
+        <p:txBody>
+          <a:bodyPr rtlCol="0" anchor="ctr"/>
+          <a:lstStyle/>
+          <a:p>
+            <a:pPr algn="ctr"/>
+            <a:endParaRPr lang="en-US"/>
+          </a:p>
+        </p:txBody>
+      </p:sp>
+      <p:sp>
+        <p:nvSpPr>
+          <p:cNvPr id="21" name="TextBox 20"/>
+          <p:cNvSpPr txBox="1"/>
+          <p:nvPr/>
+        </p:nvSpPr>
+        <p:spPr>
+          <a:xfrm>
+            <a:off x="7772400" y="2957096"/>
+            <a:ext cx="1371600" cy="338554"/>
+          </a:xfrm>
+          <a:prstGeom prst="rect">
+            <a:avLst/>
+          </a:prstGeom>
+          <a:noFill/>
+        </p:spPr>
+        <p:txBody>
+          <a:bodyPr wrap="square" rtlCol="0">
+            <a:spAutoFit/>
+          </a:bodyPr>
+          <a:lstStyle/>
+          <a:p>
+            <a:r>
+              <a:rPr lang="en-US" sz="1600" dirty="0" smtClean="0"/>
+              <a:t>temperature</a:t>
+            </a:r>
+            <a:endParaRPr lang="en-US" sz="1600" dirty="0"/>
+          </a:p>
+        </p:txBody>
+      </p:sp>
+      <p:sp>
+        <p:nvSpPr>
+          <p:cNvPr id="22" name="TextBox 21"/>
+          <p:cNvSpPr txBox="1"/>
+          <p:nvPr/>
+        </p:nvSpPr>
+        <p:spPr>
+          <a:xfrm>
+            <a:off x="838200" y="2440573"/>
+            <a:ext cx="1866901" cy="338554"/>
+          </a:xfrm>
+          <a:prstGeom prst="rect">
+            <a:avLst/>
+          </a:prstGeom>
+          <a:noFill/>
+        </p:spPr>
+        <p:txBody>
+          <a:bodyPr wrap="square" rtlCol="0">
+            <a:spAutoFit/>
+          </a:bodyPr>
+          <a:lstStyle/>
+          <a:p>
+            <a:r>
+              <a:rPr lang="en-US" sz="1600" dirty="0"/>
+              <a:t>t</a:t>
+            </a:r>
+            <a:r>
+              <a:rPr lang="en-US" sz="1600" dirty="0" smtClean="0"/>
+              <a:t>hermal_register1</a:t>
+            </a:r>
+            <a:endParaRPr lang="en-US" sz="1600" dirty="0"/>
+          </a:p>
+        </p:txBody>
+      </p:sp>
+      <p:sp>
+        <p:nvSpPr>
+          <p:cNvPr id="23" name="TextBox 22"/>
+          <p:cNvSpPr txBox="1"/>
+          <p:nvPr/>
+        </p:nvSpPr>
+        <p:spPr>
+          <a:xfrm>
+            <a:off x="838200" y="2745373"/>
+            <a:ext cx="1857376" cy="584775"/>
+          </a:xfrm>
+          <a:prstGeom prst="rect">
+            <a:avLst/>
+          </a:prstGeom>
+          <a:noFill/>
+        </p:spPr>
+        <p:txBody>
+          <a:bodyPr wrap="square" rtlCol="0">
+            <a:spAutoFit/>
+          </a:bodyPr>
+          <a:lstStyle/>
+          <a:p>
+            <a:r>
+              <a:rPr lang="en-US" sz="1600" dirty="0" smtClean="0"/>
+              <a:t>thermal_register2</a:t>
+            </a:r>
+            <a:endParaRPr lang="en-US" sz="1600" dirty="0"/>
+          </a:p>
+          <a:p>
+            <a:endParaRPr lang="en-US" sz="1600" dirty="0"/>
+          </a:p>
+        </p:txBody>
+      </p:sp>
+      <p:sp>
+        <p:nvSpPr>
+          <p:cNvPr id="24" name="TextBox 23"/>
+          <p:cNvSpPr txBox="1"/>
+          <p:nvPr/>
+        </p:nvSpPr>
+        <p:spPr>
+          <a:xfrm>
+            <a:off x="838200" y="3050173"/>
+            <a:ext cx="1828800" cy="584775"/>
+          </a:xfrm>
+          <a:prstGeom prst="rect">
+            <a:avLst/>
+          </a:prstGeom>
+          <a:noFill/>
+        </p:spPr>
+        <p:txBody>
+          <a:bodyPr wrap="square" rtlCol="0">
+            <a:spAutoFit/>
+          </a:bodyPr>
+          <a:lstStyle/>
+          <a:p>
+            <a:r>
+              <a:rPr lang="en-US" sz="1600" dirty="0" smtClean="0"/>
+              <a:t>thermal_register3</a:t>
+            </a:r>
+            <a:endParaRPr lang="en-US" sz="1600" dirty="0"/>
+          </a:p>
+          <a:p>
+            <a:endParaRPr lang="en-US" sz="1600" dirty="0"/>
+          </a:p>
+        </p:txBody>
+      </p:sp>
+      <p:sp>
+        <p:nvSpPr>
+          <p:cNvPr id="25" name="TextBox 24"/>
+          <p:cNvSpPr txBox="1"/>
+          <p:nvPr/>
+        </p:nvSpPr>
+        <p:spPr>
+          <a:xfrm>
+            <a:off x="838200" y="3352800"/>
+            <a:ext cx="1828800" cy="584775"/>
+          </a:xfrm>
+          <a:prstGeom prst="rect">
+            <a:avLst/>
+          </a:prstGeom>
+          <a:noFill/>
+        </p:spPr>
+        <p:txBody>
+          <a:bodyPr wrap="square" rtlCol="0">
+            <a:spAutoFit/>
+          </a:bodyPr>
+          <a:lstStyle/>
+          <a:p>
+            <a:r>
+              <a:rPr lang="en-US" sz="1600" dirty="0" smtClean="0"/>
+              <a:t>thermal_register4</a:t>
+            </a:r>
+            <a:endParaRPr lang="en-US" sz="1600" dirty="0"/>
+          </a:p>
+          <a:p>
+            <a:endParaRPr lang="en-US" sz="1600" dirty="0"/>
+          </a:p>
+        </p:txBody>
+      </p:sp>
+      <p:sp>
+        <p:nvSpPr>
+          <p:cNvPr id="26" name="TextBox 25"/>
+          <p:cNvSpPr txBox="1"/>
+          <p:nvPr/>
+        </p:nvSpPr>
+        <p:spPr>
+          <a:xfrm>
+            <a:off x="838200" y="3659773"/>
+            <a:ext cx="1828800" cy="584775"/>
+          </a:xfrm>
+          <a:prstGeom prst="rect">
+            <a:avLst/>
+          </a:prstGeom>
+          <a:noFill/>
+        </p:spPr>
+        <p:txBody>
+          <a:bodyPr wrap="square" rtlCol="0">
+            <a:spAutoFit/>
+          </a:bodyPr>
+          <a:lstStyle/>
+          <a:p>
+            <a:r>
+              <a:rPr lang="en-US" sz="1600" dirty="0" smtClean="0"/>
+              <a:t>thermal_register5</a:t>
+            </a:r>
+            <a:endParaRPr lang="en-US" sz="1600" dirty="0"/>
+          </a:p>
+          <a:p>
+            <a:endParaRPr lang="en-US" sz="1600" dirty="0"/>
+          </a:p>
+        </p:txBody>
+      </p:sp>
+      <p:sp>
+        <p:nvSpPr>
+          <p:cNvPr id="27" name="TextBox 26"/>
+          <p:cNvSpPr txBox="1"/>
+          <p:nvPr/>
+        </p:nvSpPr>
+        <p:spPr>
+          <a:xfrm>
+            <a:off x="2114549" y="3951103"/>
+            <a:ext cx="619126" cy="307777"/>
+          </a:xfrm>
+          <a:prstGeom prst="rect">
+            <a:avLst/>
+          </a:prstGeom>
+          <a:noFill/>
+        </p:spPr>
+        <p:txBody>
+          <a:bodyPr wrap="square" rtlCol="0">
+            <a:spAutoFit/>
+          </a:bodyPr>
+          <a:lstStyle/>
+          <a:p>
+            <a:pPr algn="r"/>
+            <a:r>
+              <a:rPr lang="en-US" sz="1400" dirty="0" smtClean="0"/>
+              <a:t>clock</a:t>
+            </a:r>
+            <a:endParaRPr lang="en-US" sz="1400" dirty="0"/>
+          </a:p>
+        </p:txBody>
+      </p:sp>
+      <p:sp>
+        <p:nvSpPr>
+          <p:cNvPr id="28" name="TextBox 27"/>
+          <p:cNvSpPr txBox="1"/>
+          <p:nvPr/>
+        </p:nvSpPr>
+        <p:spPr>
+          <a:xfrm>
+            <a:off x="1914524" y="4210050"/>
+            <a:ext cx="781051" cy="307777"/>
+          </a:xfrm>
+          <a:prstGeom prst="rect">
+            <a:avLst/>
+          </a:prstGeom>
+          <a:noFill/>
+        </p:spPr>
+        <p:txBody>
+          <a:bodyPr wrap="square" rtlCol="0">
+            <a:spAutoFit/>
+          </a:bodyPr>
+          <a:lstStyle/>
+          <a:p>
+            <a:pPr algn="r"/>
+            <a:r>
+              <a:rPr lang="en-US" sz="1400" dirty="0" err="1"/>
+              <a:t>r</a:t>
+            </a:r>
+            <a:r>
+              <a:rPr lang="en-US" sz="1400" dirty="0" err="1" smtClean="0"/>
+              <a:t>eset_n</a:t>
+            </a:r>
+            <a:endParaRPr lang="en-US" sz="1400" dirty="0"/>
+          </a:p>
+        </p:txBody>
+      </p:sp>
+      <p:sp>
+        <p:nvSpPr>
+          <p:cNvPr id="29" name="Right Arrow 28"/>
+          <p:cNvSpPr/>
+          <p:nvPr/>
+        </p:nvSpPr>
+        <p:spPr>
+          <a:xfrm>
+            <a:off x="2705100" y="4008253"/>
+            <a:ext cx="876300" cy="180975"/>
+          </a:xfrm>
+          <a:prstGeom prst="rightArrow">
+            <a:avLst/>
+          </a:prstGeom>
+          <a:solidFill>
+            <a:schemeClr val="tx2">
+              <a:lumMod val="40000"/>
+              <a:lumOff val="60000"/>
+            </a:schemeClr>
+          </a:solidFill>
+        </p:spPr>
+        <p:style>
+          <a:lnRef idx="2">
+            <a:schemeClr val="accent1">
+              <a:shade val="50000"/>
+            </a:schemeClr>
+          </a:lnRef>
+          <a:fillRef idx="1">
+            <a:schemeClr val="accent1"/>
+          </a:fillRef>
+          <a:effectRef idx="0">
+            <a:schemeClr val="accent1"/>
+          </a:effectRef>
+          <a:fontRef idx="minor">
+            <a:schemeClr val="lt1"/>
+          </a:fontRef>
+        </p:style>
+        <p:txBody>
+          <a:bodyPr rtlCol="0" anchor="ctr"/>
+          <a:lstStyle/>
+          <a:p>
+            <a:pPr algn="ctr"/>
+            <a:endParaRPr lang="en-US"/>
+          </a:p>
+        </p:txBody>
+      </p:sp>
+      <p:sp>
+        <p:nvSpPr>
+          <p:cNvPr id="30" name="Right Arrow 29"/>
+          <p:cNvSpPr/>
+          <p:nvPr/>
+        </p:nvSpPr>
+        <p:spPr>
+          <a:xfrm>
+            <a:off x="2705099" y="4277930"/>
+            <a:ext cx="876300" cy="180975"/>
+          </a:xfrm>
+          <a:prstGeom prst="rightArrow">
+            <a:avLst/>
+          </a:prstGeom>
+          <a:solidFill>
+            <a:schemeClr val="tx2">
+              <a:lumMod val="40000"/>
+              <a:lumOff val="60000"/>
+            </a:schemeClr>
+          </a:solidFill>
+        </p:spPr>
+        <p:style>
+          <a:lnRef idx="2">
+            <a:schemeClr val="accent1">
+              <a:shade val="50000"/>
+            </a:schemeClr>
+          </a:lnRef>
+          <a:fillRef idx="1">
+            <a:schemeClr val="accent1"/>
+          </a:fillRef>
+          <a:effectRef idx="0">
+            <a:schemeClr val="accent1"/>
+          </a:effectRef>
+          <a:fontRef idx="minor">
+            <a:schemeClr val="lt1"/>
+          </a:fontRef>
+        </p:style>
+        <p:txBody>
+          <a:bodyPr rtlCol="0" anchor="ctr"/>
+          <a:lstStyle/>
+          <a:p>
+            <a:pPr algn="ctr"/>
+            <a:endParaRPr lang="en-US"/>
+          </a:p>
+        </p:txBody>
+      </p:sp>
+      <p:sp>
+        <p:nvSpPr>
+          <p:cNvPr id="31" name="Flowchart: Summing Junction 30"/>
+          <p:cNvSpPr/>
+          <p:nvPr/>
+        </p:nvSpPr>
+        <p:spPr>
+          <a:xfrm>
+            <a:off x="4495800" y="2960102"/>
+            <a:ext cx="516523" cy="516523"/>
+          </a:xfrm>
+          <a:prstGeom prst="flowChartSummingJunction">
+            <a:avLst/>
+          </a:prstGeom>
+        </p:spPr>
+        <p:style>
+          <a:lnRef idx="2">
+            <a:schemeClr val="accent1">
+              <a:shade val="50000"/>
+            </a:schemeClr>
+          </a:lnRef>
+          <a:fillRef idx="1">
+            <a:schemeClr val="accent1"/>
+          </a:fillRef>
+          <a:effectRef idx="0">
+            <a:schemeClr val="accent1"/>
+          </a:effectRef>
+          <a:fontRef idx="minor">
+            <a:schemeClr val="lt1"/>
+          </a:fontRef>
+        </p:style>
+        <p:txBody>
+          <a:bodyPr rtlCol="0" anchor="ctr"/>
+          <a:lstStyle/>
+          <a:p>
+            <a:pPr algn="ctr"/>
+            <a:endParaRPr lang="en-US"/>
+          </a:p>
+        </p:txBody>
+      </p:sp>
+      <p:cxnSp>
+        <p:nvCxnSpPr>
+          <p:cNvPr id="33" name="Elbow Connector 32"/>
+          <p:cNvCxnSpPr>
+            <a:stCxn id="10" idx="3"/>
+            <a:endCxn id="31" idx="0"/>
+          </p:cNvCxnSpPr>
+          <p:nvPr/>
+        </p:nvCxnSpPr>
+        <p:spPr>
+          <a:xfrm>
+            <a:off x="3581400" y="2609850"/>
+            <a:ext cx="1172662" cy="350252"/>
+          </a:xfrm>
+          <a:prstGeom prst="bentConnector2">
+            <a:avLst/>
+          </a:prstGeom>
+          <a:ln>
+            <a:tailEnd type="arrow"/>
+          </a:ln>
+        </p:spPr>
+        <p:style>
+          <a:lnRef idx="1">
+            <a:schemeClr val="accent1"/>
+          </a:lnRef>
+          <a:fillRef idx="0">
+            <a:schemeClr val="accent1"/>
+          </a:fillRef>
+          <a:effectRef idx="0">
+            <a:schemeClr val="accent1"/>
+          </a:effectRef>
+          <a:fontRef idx="minor">
+            <a:schemeClr val="tx1"/>
+          </a:fontRef>
+        </p:style>
+      </p:cxnSp>
+      <p:cxnSp>
+        <p:nvCxnSpPr>
+          <p:cNvPr id="35" name="Elbow Connector 34"/>
+          <p:cNvCxnSpPr>
+            <a:stCxn id="17" idx="3"/>
+            <a:endCxn id="31" idx="1"/>
+          </p:cNvCxnSpPr>
+          <p:nvPr/>
+        </p:nvCxnSpPr>
+        <p:spPr>
+          <a:xfrm>
+            <a:off x="3581400" y="2914650"/>
+            <a:ext cx="990043" cy="121095"/>
+          </a:xfrm>
+          <a:prstGeom prst="bentConnector2">
+            <a:avLst/>
+          </a:prstGeom>
+          <a:ln>
+            <a:tailEnd type="arrow"/>
+          </a:ln>
+        </p:spPr>
+        <p:style>
+          <a:lnRef idx="1">
+            <a:schemeClr val="accent1"/>
+          </a:lnRef>
+          <a:fillRef idx="0">
+            <a:schemeClr val="accent1"/>
+          </a:fillRef>
+          <a:effectRef idx="0">
+            <a:schemeClr val="accent1"/>
+          </a:effectRef>
+          <a:fontRef idx="minor">
+            <a:schemeClr val="tx1"/>
+          </a:fontRef>
+        </p:style>
+      </p:cxnSp>
+      <p:cxnSp>
+        <p:nvCxnSpPr>
+          <p:cNvPr id="37" name="Elbow Connector 36"/>
+          <p:cNvCxnSpPr>
+            <a:stCxn id="18" idx="3"/>
+            <a:endCxn id="31" idx="2"/>
+          </p:cNvCxnSpPr>
+          <p:nvPr/>
+        </p:nvCxnSpPr>
+        <p:spPr>
+          <a:xfrm flipV="1">
+            <a:off x="3581400" y="3218364"/>
+            <a:ext cx="914400" cy="1086"/>
+          </a:xfrm>
+          <a:prstGeom prst="bentConnector3">
+            <a:avLst/>
+          </a:prstGeom>
+          <a:ln>
+            <a:tailEnd type="arrow"/>
+          </a:ln>
+        </p:spPr>
+        <p:style>
+          <a:lnRef idx="1">
+            <a:schemeClr val="accent1"/>
+          </a:lnRef>
+          <a:fillRef idx="0">
+            <a:schemeClr val="accent1"/>
+          </a:fillRef>
+          <a:effectRef idx="0">
+            <a:schemeClr val="accent1"/>
+          </a:effectRef>
+          <a:fontRef idx="minor">
+            <a:schemeClr val="tx1"/>
+          </a:fontRef>
+        </p:style>
+      </p:cxnSp>
+      <p:cxnSp>
+        <p:nvCxnSpPr>
+          <p:cNvPr id="39" name="Elbow Connector 38"/>
+          <p:cNvCxnSpPr>
+            <a:stCxn id="19" idx="3"/>
+            <a:endCxn id="31" idx="3"/>
+          </p:cNvCxnSpPr>
+          <p:nvPr/>
+        </p:nvCxnSpPr>
+        <p:spPr>
+          <a:xfrm flipV="1">
+            <a:off x="3581400" y="3400982"/>
+            <a:ext cx="990043" cy="123268"/>
+          </a:xfrm>
+          <a:prstGeom prst="bentConnector2">
+            <a:avLst/>
+          </a:prstGeom>
+          <a:ln>
+            <a:tailEnd type="arrow"/>
+          </a:ln>
+        </p:spPr>
+        <p:style>
+          <a:lnRef idx="1">
+            <a:schemeClr val="accent1"/>
+          </a:lnRef>
+          <a:fillRef idx="0">
+            <a:schemeClr val="accent1"/>
+          </a:fillRef>
+          <a:effectRef idx="0">
+            <a:schemeClr val="accent1"/>
+          </a:effectRef>
+          <a:fontRef idx="minor">
+            <a:schemeClr val="tx1"/>
+          </a:fontRef>
+        </p:style>
+      </p:cxnSp>
+      <p:cxnSp>
+        <p:nvCxnSpPr>
+          <p:cNvPr id="41" name="Elbow Connector 40"/>
+          <p:cNvCxnSpPr>
+            <a:stCxn id="20" idx="3"/>
+            <a:endCxn id="31" idx="4"/>
+          </p:cNvCxnSpPr>
+          <p:nvPr/>
+        </p:nvCxnSpPr>
+        <p:spPr>
+          <a:xfrm flipV="1">
+            <a:off x="3581400" y="3476625"/>
+            <a:ext cx="1172662" cy="352425"/>
+          </a:xfrm>
+          <a:prstGeom prst="bentConnector2">
+            <a:avLst/>
+          </a:prstGeom>
+          <a:ln>
+            <a:tailEnd type="arrow"/>
+          </a:ln>
+        </p:spPr>
+        <p:style>
+          <a:lnRef idx="1">
+            <a:schemeClr val="accent1"/>
+          </a:lnRef>
+          <a:fillRef idx="0">
+            <a:schemeClr val="accent1"/>
+          </a:fillRef>
+          <a:effectRef idx="0">
+            <a:schemeClr val="accent1"/>
+          </a:effectRef>
+          <a:fontRef idx="minor">
+            <a:schemeClr val="tx1"/>
+          </a:fontRef>
+        </p:style>
+      </p:cxnSp>
+      <p:sp>
+        <p:nvSpPr>
+          <p:cNvPr id="42" name="Flowchart: Predefined Process 41"/>
+          <p:cNvSpPr/>
+          <p:nvPr/>
+        </p:nvSpPr>
+        <p:spPr>
+          <a:xfrm>
+            <a:off x="5486400" y="2762250"/>
+            <a:ext cx="914400" cy="720298"/>
+          </a:xfrm>
+          <a:prstGeom prst="flowChartPredefinedProcess">
+            <a:avLst/>
+          </a:prstGeom>
+        </p:spPr>
+        <p:style>
+          <a:lnRef idx="2">
+            <a:schemeClr val="accent1">
+              <a:shade val="50000"/>
+            </a:schemeClr>
+          </a:lnRef>
+          <a:fillRef idx="1">
+            <a:schemeClr val="accent1"/>
+          </a:fillRef>
+          <a:effectRef idx="0">
+            <a:schemeClr val="accent1"/>
+          </a:effectRef>
+          <a:fontRef idx="minor">
+            <a:schemeClr val="lt1"/>
+          </a:fontRef>
+        </p:style>
+        <p:txBody>
+          <a:bodyPr rtlCol="0" anchor="ctr"/>
+          <a:lstStyle/>
+          <a:p>
+            <a:pPr algn="ctr"/>
+            <a:endParaRPr lang="en-US"/>
+          </a:p>
+        </p:txBody>
+      </p:sp>
+      <p:cxnSp>
+        <p:nvCxnSpPr>
+          <p:cNvPr id="44" name="Elbow Connector 43"/>
+          <p:cNvCxnSpPr>
+            <a:stCxn id="31" idx="6"/>
+          </p:cNvCxnSpPr>
+          <p:nvPr/>
+        </p:nvCxnSpPr>
+        <p:spPr>
+          <a:xfrm flipV="1">
+            <a:off x="5012323" y="3122399"/>
+            <a:ext cx="474077" cy="95965"/>
+          </a:xfrm>
+          <a:prstGeom prst="bentConnector3">
+            <a:avLst/>
+          </a:prstGeom>
+          <a:ln>
+            <a:tailEnd type="arrow"/>
+          </a:ln>
+        </p:spPr>
+        <p:style>
+          <a:lnRef idx="1">
+            <a:schemeClr val="accent1"/>
+          </a:lnRef>
+          <a:fillRef idx="0">
+            <a:schemeClr val="accent1"/>
+          </a:fillRef>
+          <a:effectRef idx="0">
+            <a:schemeClr val="accent1"/>
+          </a:effectRef>
+          <a:fontRef idx="minor">
+            <a:schemeClr val="tx1"/>
+          </a:fontRef>
+        </p:style>
+      </p:cxnSp>
+      <p:cxnSp>
+        <p:nvCxnSpPr>
+          <p:cNvPr id="46" name="Elbow Connector 45"/>
+          <p:cNvCxnSpPr>
+            <a:stCxn id="42" idx="3"/>
+            <a:endCxn id="9" idx="1"/>
+          </p:cNvCxnSpPr>
+          <p:nvPr/>
+        </p:nvCxnSpPr>
+        <p:spPr>
+          <a:xfrm>
+            <a:off x="6400800" y="3122399"/>
+            <a:ext cx="381000" cy="3974"/>
+          </a:xfrm>
+          <a:prstGeom prst="bentConnector3">
+            <a:avLst/>
+          </a:prstGeom>
+          <a:ln>
+            <a:tailEnd type="arrow"/>
+          </a:ln>
+        </p:spPr>
+        <p:style>
+          <a:lnRef idx="1">
+            <a:schemeClr val="accent1"/>
+          </a:lnRef>
+          <a:fillRef idx="0">
+            <a:schemeClr val="accent1"/>
+          </a:fillRef>
+          <a:effectRef idx="0">
+            <a:schemeClr val="accent1"/>
+          </a:effectRef>
+          <a:fontRef idx="minor">
+            <a:schemeClr val="tx1"/>
+          </a:fontRef>
+        </p:style>
+      </p:cxnSp>
+      <p:sp>
+        <p:nvSpPr>
+          <p:cNvPr id="47" name="Left Brace 46"/>
+          <p:cNvSpPr/>
+          <p:nvPr/>
+        </p:nvSpPr>
+        <p:spPr>
+          <a:xfrm>
+            <a:off x="609600" y="2497723"/>
+            <a:ext cx="228600" cy="1497002"/>
+          </a:xfrm>
+          <a:prstGeom prst="leftBrace">
+            <a:avLst/>
+          </a:prstGeom>
+        </p:spPr>
+        <p:style>
+          <a:lnRef idx="1">
+            <a:schemeClr val="accent1"/>
+          </a:lnRef>
+          <a:fillRef idx="0">
+            <a:schemeClr val="accent1"/>
+          </a:fillRef>
+          <a:effectRef idx="0">
+            <a:schemeClr val="accent1"/>
+          </a:effectRef>
+          <a:fontRef idx="minor">
+            <a:schemeClr val="tx1"/>
+          </a:fontRef>
+        </p:style>
+        <p:txBody>
+          <a:bodyPr rtlCol="0" anchor="ctr"/>
+          <a:lstStyle/>
+          <a:p>
+            <a:pPr algn="ctr"/>
+            <a:endParaRPr lang="en-US"/>
+          </a:p>
+        </p:txBody>
+      </p:sp>
+      <p:sp>
+        <p:nvSpPr>
+          <p:cNvPr id="48" name="TextBox 47"/>
+          <p:cNvSpPr txBox="1"/>
+          <p:nvPr/>
+        </p:nvSpPr>
+        <p:spPr>
+          <a:xfrm>
+            <a:off x="200680" y="2429395"/>
+            <a:ext cx="523220" cy="1609205"/>
+          </a:xfrm>
+          <a:prstGeom prst="rect">
+            <a:avLst/>
+          </a:prstGeom>
+          <a:noFill/>
+        </p:spPr>
+        <p:txBody>
+          <a:bodyPr vert="vert270" wrap="square" rtlCol="0" anchor="ctr" anchorCtr="1">
+            <a:spAutoFit/>
+          </a:bodyPr>
+          <a:lstStyle/>
+          <a:p>
+            <a:r>
+              <a:rPr lang="en-US" sz="1100" dirty="0" smtClean="0"/>
+              <a:t>From MBIST Instruments</a:t>
+            </a:r>
+            <a:endParaRPr lang="en-US" sz="1100" dirty="0"/>
+          </a:p>
+        </p:txBody>
+      </p:sp>
+    </p:spTree>
+    <p:extLst>
+      <p:ext uri="{BB962C8B-B14F-4D97-AF65-F5344CB8AC3E}">
+        <p14:creationId xmlns:p14="http://schemas.microsoft.com/office/powerpoint/2010/main" val="3808866669"/>
+      </p:ext>
+    </p:extLst>
+  </p:cSld>
+  <p:clrMapOvr>
+    <a:masterClrMapping/>
+  </p:clrMapOvr>
+</p:sld>
+</file>
+
+<file path=ppt/slides/slide14.xml><?xml version="1.0" encoding="utf-8"?>
+<p:sld xmlns:a="http://schemas.openxmlformats.org/drawingml/2006/main" xmlns:r="http://schemas.openxmlformats.org/officeDocument/2006/relationships" xmlns:p="http://schemas.openxmlformats.org/presentationml/2006/main">
+  <p:cSld>
+    <p:spTree>
+      <p:nvGrpSpPr>
+        <p:cNvPr id="1" name=""/>
+        <p:cNvGrpSpPr/>
+        <p:nvPr/>
+      </p:nvGrpSpPr>
+      <p:grpSpPr>
+        <a:xfrm>
+          <a:off x="0" y="0"/>
+          <a:ext cx="0" cy="0"/>
+          <a:chOff x="0" y="0"/>
+          <a:chExt cx="0" cy="0"/>
+        </a:xfrm>
+      </p:grpSpPr>
+      <p:sp>
+        <p:nvSpPr>
+          <p:cNvPr id="6" name="Title 5"/>
+          <p:cNvSpPr>
+            <a:spLocks noGrp="1"/>
+          </p:cNvSpPr>
+          <p:nvPr>
+            <p:ph type="title"/>
+          </p:nvPr>
+        </p:nvSpPr>
+        <p:spPr/>
+        <p:txBody>
+          <a:bodyPr/>
+          <a:lstStyle/>
+          <a:p>
+            <a:r>
+              <a:rPr lang="en-US" dirty="0" smtClean="0"/>
+              <a:t>Comparator Instrument</a:t>
+            </a:r>
+            <a:endParaRPr lang="en-US" dirty="0"/>
+          </a:p>
+        </p:txBody>
+      </p:sp>
+      <p:sp>
+        <p:nvSpPr>
+          <p:cNvPr id="7" name="Text Placeholder 6"/>
+          <p:cNvSpPr>
+            <a:spLocks noGrp="1"/>
+          </p:cNvSpPr>
+          <p:nvPr>
+            <p:ph type="body" idx="1"/>
+          </p:nvPr>
+        </p:nvSpPr>
+        <p:spPr/>
+        <p:txBody>
+          <a:bodyPr/>
+          <a:lstStyle/>
+          <a:p>
+            <a:endParaRPr lang="en-US"/>
+          </a:p>
+        </p:txBody>
+      </p:sp>
+      <p:sp>
+        <p:nvSpPr>
+          <p:cNvPr id="3" name="Date Placeholder 2"/>
+          <p:cNvSpPr>
+            <a:spLocks noGrp="1"/>
+          </p:cNvSpPr>
+          <p:nvPr>
+            <p:ph type="dt" sz="half" idx="10"/>
+          </p:nvPr>
+        </p:nvSpPr>
+        <p:spPr/>
+        <p:txBody>
+          <a:bodyPr/>
+          <a:lstStyle/>
+          <a:p>
+            <a:fld id="{40BAADF0-1749-4E8B-9691-B44A5F8C0895}" type="datetime1">
+              <a:rPr lang="en-US" smtClean="0"/>
+              <a:t>7/27/2019</a:t>
+            </a:fld>
+            <a:endParaRPr lang="en-US"/>
+          </a:p>
+        </p:txBody>
+      </p:sp>
+      <p:sp>
+        <p:nvSpPr>
+          <p:cNvPr id="4" name="Footer Placeholder 3"/>
+          <p:cNvSpPr>
+            <a:spLocks noGrp="1"/>
+          </p:cNvSpPr>
+          <p:nvPr>
+            <p:ph type="ftr" sz="quarter" idx="11"/>
+          </p:nvPr>
+        </p:nvSpPr>
+        <p:spPr/>
+        <p:txBody>
+          <a:bodyPr/>
+          <a:lstStyle/>
+          <a:p>
+            <a:r>
+              <a:rPr lang="en-US" smtClean="0"/>
+              <a:t>Hardware Simulation and Software Models for P1687.1 and P2654</a:t>
+            </a:r>
+            <a:endParaRPr lang="en-US" dirty="0"/>
+          </a:p>
+        </p:txBody>
+      </p:sp>
+      <p:sp>
+        <p:nvSpPr>
+          <p:cNvPr id="5" name="Slide Number Placeholder 4"/>
+          <p:cNvSpPr>
+            <a:spLocks noGrp="1"/>
+          </p:cNvSpPr>
+          <p:nvPr>
+            <p:ph type="sldNum" sz="quarter" idx="12"/>
+          </p:nvPr>
+        </p:nvSpPr>
+        <p:spPr/>
+        <p:txBody>
+          <a:bodyPr/>
+          <a:lstStyle/>
+          <a:p>
+            <a:fld id="{BA9B540C-44DA-4F69-89C9-7C84606640D3}" type="slidenum">
+              <a:rPr lang="en-US" smtClean="0"/>
+              <a:pPr/>
+              <a:t>14</a:t>
+            </a:fld>
+            <a:endParaRPr lang="en-US"/>
+          </a:p>
+        </p:txBody>
+      </p:sp>
+    </p:spTree>
+    <p:extLst>
+      <p:ext uri="{BB962C8B-B14F-4D97-AF65-F5344CB8AC3E}">
+        <p14:creationId xmlns:p14="http://schemas.microsoft.com/office/powerpoint/2010/main" val="1034196214"/>
+      </p:ext>
+    </p:extLst>
+  </p:cSld>
+  <p:clrMapOvr>
+    <a:masterClrMapping/>
+  </p:clrMapOvr>
+</p:sld>
+</file>
+
+<file path=ppt/slides/slide15.xml><?xml version="1.0" encoding="utf-8"?>
+<p:sld xmlns:a="http://schemas.openxmlformats.org/drawingml/2006/main" xmlns:r="http://schemas.openxmlformats.org/officeDocument/2006/relationships" xmlns:p="http://schemas.openxmlformats.org/presentationml/2006/main">
+  <p:cSld>
+    <p:spTree>
+      <p:nvGrpSpPr>
+        <p:cNvPr id="1" name=""/>
+        <p:cNvGrpSpPr/>
+        <p:nvPr/>
+      </p:nvGrpSpPr>
+      <p:grpSpPr>
+        <a:xfrm>
+          <a:off x="0" y="0"/>
+          <a:ext cx="0" cy="0"/>
+          <a:chOff x="0" y="0"/>
+          <a:chExt cx="0" cy="0"/>
+        </a:xfrm>
+      </p:grpSpPr>
+      <p:sp>
+        <p:nvSpPr>
+          <p:cNvPr id="7" name="Title 6"/>
+          <p:cNvSpPr>
+            <a:spLocks noGrp="1"/>
+          </p:cNvSpPr>
+          <p:nvPr>
+            <p:ph type="title"/>
+          </p:nvPr>
+        </p:nvSpPr>
+        <p:spPr/>
+        <p:txBody>
+          <a:bodyPr/>
+          <a:lstStyle/>
+          <a:p>
+            <a:r>
+              <a:rPr lang="en-US" dirty="0" smtClean="0"/>
+              <a:t>Comparator Instrument</a:t>
+            </a:r>
+            <a:endParaRPr lang="en-US" dirty="0"/>
+          </a:p>
+        </p:txBody>
+      </p:sp>
+      <p:sp>
+        <p:nvSpPr>
+          <p:cNvPr id="4" name="Date Placeholder 3"/>
+          <p:cNvSpPr>
+            <a:spLocks noGrp="1"/>
+          </p:cNvSpPr>
+          <p:nvPr>
+            <p:ph type="dt" sz="half" idx="10"/>
+          </p:nvPr>
+        </p:nvSpPr>
+        <p:spPr/>
+        <p:txBody>
+          <a:bodyPr/>
+          <a:lstStyle/>
+          <a:p>
+            <a:fld id="{09CAEA93-55E7-4DA9-90C2-089A26EEFEC4}" type="datetime1">
+              <a:rPr lang="en-US" smtClean="0"/>
+              <a:t>7/27/2019</a:t>
+            </a:fld>
+            <a:endParaRPr lang="en-US"/>
+          </a:p>
+        </p:txBody>
+      </p:sp>
+      <p:sp>
+        <p:nvSpPr>
+          <p:cNvPr id="5" name="Footer Placeholder 4"/>
+          <p:cNvSpPr>
+            <a:spLocks noGrp="1"/>
+          </p:cNvSpPr>
+          <p:nvPr>
+            <p:ph type="ftr" sz="quarter" idx="11"/>
+          </p:nvPr>
+        </p:nvSpPr>
+        <p:spPr/>
+        <p:txBody>
+          <a:bodyPr/>
+          <a:lstStyle/>
+          <a:p>
+            <a:r>
+              <a:rPr lang="en-US" smtClean="0"/>
+              <a:t>Footer Text</a:t>
+            </a:r>
+            <a:endParaRPr lang="en-US"/>
+          </a:p>
+        </p:txBody>
+      </p:sp>
+      <p:sp>
+        <p:nvSpPr>
+          <p:cNvPr id="6" name="Slide Number Placeholder 5"/>
+          <p:cNvSpPr>
+            <a:spLocks noGrp="1"/>
+          </p:cNvSpPr>
+          <p:nvPr>
+            <p:ph type="sldNum" sz="quarter" idx="12"/>
+          </p:nvPr>
+        </p:nvSpPr>
+        <p:spPr/>
+        <p:txBody>
+          <a:bodyPr/>
+          <a:lstStyle/>
+          <a:p>
+            <a:fld id="{BA9B540C-44DA-4F69-89C9-7C84606640D3}" type="slidenum">
+              <a:rPr lang="en-US" smtClean="0"/>
+              <a:pPr/>
+              <a:t>15</a:t>
+            </a:fld>
+            <a:endParaRPr lang="en-US"/>
+          </a:p>
+        </p:txBody>
+      </p:sp>
+      <p:sp>
+        <p:nvSpPr>
+          <p:cNvPr id="8" name="Rectangle 7"/>
+          <p:cNvSpPr/>
+          <p:nvPr/>
+        </p:nvSpPr>
+        <p:spPr>
+          <a:xfrm>
+            <a:off x="2819400" y="1809750"/>
+            <a:ext cx="3124200" cy="2209800"/>
+          </a:xfrm>
+          <a:prstGeom prst="rect">
+            <a:avLst/>
+          </a:prstGeom>
+          <a:solidFill>
+            <a:schemeClr val="accent3">
+              <a:lumMod val="40000"/>
+              <a:lumOff val="60000"/>
+            </a:schemeClr>
+          </a:solidFill>
+        </p:spPr>
+        <p:style>
+          <a:lnRef idx="2">
+            <a:schemeClr val="accent1">
+              <a:shade val="50000"/>
+            </a:schemeClr>
+          </a:lnRef>
+          <a:fillRef idx="1">
+            <a:schemeClr val="accent1"/>
+          </a:fillRef>
+          <a:effectRef idx="0">
+            <a:schemeClr val="accent1"/>
+          </a:effectRef>
+          <a:fontRef idx="minor">
+            <a:schemeClr val="lt1"/>
+          </a:fontRef>
+        </p:style>
+        <p:txBody>
+          <a:bodyPr rtlCol="0" anchor="ctr"/>
+          <a:lstStyle/>
+          <a:p>
+            <a:pPr algn="ctr"/>
+            <a:endParaRPr lang="en-US"/>
+          </a:p>
+        </p:txBody>
+      </p:sp>
+      <p:sp>
+        <p:nvSpPr>
+          <p:cNvPr id="9" name="TextBox 8"/>
+          <p:cNvSpPr txBox="1"/>
+          <p:nvPr/>
+        </p:nvSpPr>
+        <p:spPr>
+          <a:xfrm>
+            <a:off x="1181100" y="1844370"/>
+            <a:ext cx="781051" cy="307777"/>
+          </a:xfrm>
+          <a:prstGeom prst="rect">
+            <a:avLst/>
+          </a:prstGeom>
+          <a:noFill/>
+        </p:spPr>
+        <p:txBody>
+          <a:bodyPr wrap="square" rtlCol="0">
+            <a:spAutoFit/>
+          </a:bodyPr>
+          <a:lstStyle/>
+          <a:p>
+            <a:pPr algn="r"/>
+            <a:r>
+              <a:rPr lang="en-US" sz="1400" dirty="0" smtClean="0"/>
+              <a:t>parent</a:t>
+            </a:r>
+            <a:endParaRPr lang="en-US" sz="1400" dirty="0"/>
+          </a:p>
+        </p:txBody>
+      </p:sp>
+      <p:sp>
+        <p:nvSpPr>
+          <p:cNvPr id="10" name="TextBox 9"/>
+          <p:cNvSpPr txBox="1"/>
+          <p:nvPr/>
+        </p:nvSpPr>
+        <p:spPr>
+          <a:xfrm>
+            <a:off x="1162050" y="2109827"/>
+            <a:ext cx="781051" cy="307777"/>
+          </a:xfrm>
+          <a:prstGeom prst="rect">
+            <a:avLst/>
+          </a:prstGeom>
+          <a:noFill/>
+        </p:spPr>
+        <p:txBody>
+          <a:bodyPr wrap="square" rtlCol="0">
+            <a:spAutoFit/>
+          </a:bodyPr>
+          <a:lstStyle/>
+          <a:p>
+            <a:pPr algn="r"/>
+            <a:r>
+              <a:rPr lang="en-US" sz="1400" dirty="0" smtClean="0"/>
+              <a:t>name</a:t>
+            </a:r>
+            <a:endParaRPr lang="en-US" sz="1400" dirty="0"/>
+          </a:p>
+        </p:txBody>
+      </p:sp>
+      <p:sp>
+        <p:nvSpPr>
+          <p:cNvPr id="11" name="Left Brace 10"/>
+          <p:cNvSpPr/>
+          <p:nvPr/>
+        </p:nvSpPr>
+        <p:spPr>
+          <a:xfrm>
+            <a:off x="1181100" y="1844370"/>
+            <a:ext cx="180975" cy="574980"/>
+          </a:xfrm>
+          <a:prstGeom prst="leftBrace">
+            <a:avLst/>
+          </a:prstGeom>
+        </p:spPr>
+        <p:style>
+          <a:lnRef idx="1">
+            <a:schemeClr val="accent1"/>
+          </a:lnRef>
+          <a:fillRef idx="0">
+            <a:schemeClr val="accent1"/>
+          </a:fillRef>
+          <a:effectRef idx="0">
+            <a:schemeClr val="accent1"/>
+          </a:effectRef>
+          <a:fontRef idx="minor">
+            <a:schemeClr val="tx1"/>
+          </a:fontRef>
+        </p:style>
+        <p:txBody>
+          <a:bodyPr rtlCol="0" anchor="ctr"/>
+          <a:lstStyle/>
+          <a:p>
+            <a:pPr algn="ctr"/>
+            <a:endParaRPr lang="en-US"/>
+          </a:p>
+        </p:txBody>
+      </p:sp>
+      <p:sp>
+        <p:nvSpPr>
+          <p:cNvPr id="12" name="TextBox 11"/>
+          <p:cNvSpPr txBox="1"/>
+          <p:nvPr/>
+        </p:nvSpPr>
+        <p:spPr>
+          <a:xfrm>
+            <a:off x="304800" y="1951897"/>
+            <a:ext cx="857250" cy="369332"/>
+          </a:xfrm>
+          <a:prstGeom prst="rect">
+            <a:avLst/>
+          </a:prstGeom>
+          <a:noFill/>
+        </p:spPr>
+        <p:txBody>
+          <a:bodyPr wrap="square" rtlCol="0">
+            <a:spAutoFit/>
+          </a:bodyPr>
+          <a:lstStyle/>
+          <a:p>
+            <a:pPr algn="r"/>
+            <a:r>
+              <a:rPr lang="en-US" sz="900" dirty="0" smtClean="0"/>
+              <a:t>For </a:t>
+            </a:r>
+            <a:r>
+              <a:rPr lang="en-US" sz="900" dirty="0" err="1" smtClean="0"/>
+              <a:t>myHDL</a:t>
+            </a:r>
+            <a:r>
+              <a:rPr lang="en-US" sz="900" dirty="0" smtClean="0"/>
+              <a:t> debugging</a:t>
+            </a:r>
+            <a:endParaRPr lang="en-US" sz="900" dirty="0"/>
+          </a:p>
+        </p:txBody>
+      </p:sp>
+      <p:sp>
+        <p:nvSpPr>
+          <p:cNvPr id="13" name="Right Arrow 12"/>
+          <p:cNvSpPr/>
+          <p:nvPr/>
+        </p:nvSpPr>
+        <p:spPr>
+          <a:xfrm>
+            <a:off x="1952626" y="2173227"/>
+            <a:ext cx="876300" cy="180975"/>
+          </a:xfrm>
+          <a:prstGeom prst="rightArrow">
+            <a:avLst/>
+          </a:prstGeom>
+          <a:solidFill>
+            <a:schemeClr val="accent5">
+              <a:lumMod val="40000"/>
+              <a:lumOff val="60000"/>
+            </a:schemeClr>
+          </a:solidFill>
+        </p:spPr>
+        <p:style>
+          <a:lnRef idx="2">
+            <a:schemeClr val="accent1">
+              <a:shade val="50000"/>
+            </a:schemeClr>
+          </a:lnRef>
+          <a:fillRef idx="1">
+            <a:schemeClr val="accent1"/>
+          </a:fillRef>
+          <a:effectRef idx="0">
+            <a:schemeClr val="accent1"/>
+          </a:effectRef>
+          <a:fontRef idx="minor">
+            <a:schemeClr val="lt1"/>
+          </a:fontRef>
+        </p:style>
+        <p:txBody>
+          <a:bodyPr rtlCol="0" anchor="ctr"/>
+          <a:lstStyle/>
+          <a:p>
+            <a:pPr algn="ctr"/>
+            <a:endParaRPr lang="en-US"/>
+          </a:p>
+        </p:txBody>
+      </p:sp>
+      <p:sp>
+        <p:nvSpPr>
+          <p:cNvPr id="14" name="Right Arrow 13"/>
+          <p:cNvSpPr/>
+          <p:nvPr/>
+        </p:nvSpPr>
+        <p:spPr>
+          <a:xfrm>
+            <a:off x="1943101" y="1907770"/>
+            <a:ext cx="876300" cy="180975"/>
+          </a:xfrm>
+          <a:prstGeom prst="rightArrow">
+            <a:avLst/>
+          </a:prstGeom>
+          <a:solidFill>
+            <a:schemeClr val="accent5">
+              <a:lumMod val="40000"/>
+              <a:lumOff val="60000"/>
+            </a:schemeClr>
+          </a:solidFill>
+        </p:spPr>
+        <p:style>
+          <a:lnRef idx="2">
+            <a:schemeClr val="accent1">
+              <a:shade val="50000"/>
+            </a:schemeClr>
+          </a:lnRef>
+          <a:fillRef idx="1">
+            <a:schemeClr val="accent1"/>
+          </a:fillRef>
+          <a:effectRef idx="0">
+            <a:schemeClr val="accent1"/>
+          </a:effectRef>
+          <a:fontRef idx="minor">
+            <a:schemeClr val="lt1"/>
+          </a:fontRef>
+        </p:style>
+        <p:txBody>
+          <a:bodyPr rtlCol="0" anchor="ctr"/>
+          <a:lstStyle/>
+          <a:p>
+            <a:pPr algn="ctr"/>
+            <a:endParaRPr lang="en-US"/>
+          </a:p>
+        </p:txBody>
+      </p:sp>
+      <p:sp>
+        <p:nvSpPr>
+          <p:cNvPr id="15" name="TextBox 14"/>
+          <p:cNvSpPr txBox="1"/>
+          <p:nvPr/>
+        </p:nvSpPr>
+        <p:spPr>
+          <a:xfrm>
+            <a:off x="1343025" y="2419350"/>
+            <a:ext cx="619126" cy="307777"/>
+          </a:xfrm>
+          <a:prstGeom prst="rect">
+            <a:avLst/>
+          </a:prstGeom>
+          <a:noFill/>
+        </p:spPr>
+        <p:txBody>
+          <a:bodyPr wrap="square" rtlCol="0">
+            <a:spAutoFit/>
+          </a:bodyPr>
+          <a:lstStyle/>
+          <a:p>
+            <a:pPr algn="r"/>
+            <a:r>
+              <a:rPr lang="en-US" sz="1400" dirty="0" smtClean="0"/>
+              <a:t>clock</a:t>
+            </a:r>
+            <a:endParaRPr lang="en-US" sz="1400" dirty="0"/>
+          </a:p>
+        </p:txBody>
+      </p:sp>
+      <p:sp>
+        <p:nvSpPr>
+          <p:cNvPr id="16" name="TextBox 15"/>
+          <p:cNvSpPr txBox="1"/>
+          <p:nvPr/>
+        </p:nvSpPr>
+        <p:spPr>
+          <a:xfrm>
+            <a:off x="1143000" y="2678297"/>
+            <a:ext cx="781051" cy="307777"/>
+          </a:xfrm>
+          <a:prstGeom prst="rect">
+            <a:avLst/>
+          </a:prstGeom>
+          <a:noFill/>
+        </p:spPr>
+        <p:txBody>
+          <a:bodyPr wrap="square" rtlCol="0">
+            <a:spAutoFit/>
+          </a:bodyPr>
+          <a:lstStyle/>
+          <a:p>
+            <a:pPr algn="r"/>
+            <a:r>
+              <a:rPr lang="en-US" sz="1400" dirty="0" err="1"/>
+              <a:t>r</a:t>
+            </a:r>
+            <a:r>
+              <a:rPr lang="en-US" sz="1400" dirty="0" err="1" smtClean="0"/>
+              <a:t>eset_n</a:t>
+            </a:r>
+            <a:endParaRPr lang="en-US" sz="1400" dirty="0"/>
+          </a:p>
+        </p:txBody>
+      </p:sp>
+      <p:sp>
+        <p:nvSpPr>
+          <p:cNvPr id="17" name="Right Arrow 16"/>
+          <p:cNvSpPr/>
+          <p:nvPr/>
+        </p:nvSpPr>
+        <p:spPr>
+          <a:xfrm>
+            <a:off x="1933576" y="2476500"/>
+            <a:ext cx="876300" cy="180975"/>
+          </a:xfrm>
+          <a:prstGeom prst="rightArrow">
+            <a:avLst/>
+          </a:prstGeom>
+          <a:solidFill>
+            <a:schemeClr val="tx2">
+              <a:lumMod val="40000"/>
+              <a:lumOff val="60000"/>
+            </a:schemeClr>
+          </a:solidFill>
+        </p:spPr>
+        <p:style>
+          <a:lnRef idx="2">
+            <a:schemeClr val="accent1">
+              <a:shade val="50000"/>
+            </a:schemeClr>
+          </a:lnRef>
+          <a:fillRef idx="1">
+            <a:schemeClr val="accent1"/>
+          </a:fillRef>
+          <a:effectRef idx="0">
+            <a:schemeClr val="accent1"/>
+          </a:effectRef>
+          <a:fontRef idx="minor">
+            <a:schemeClr val="lt1"/>
+          </a:fontRef>
+        </p:style>
+        <p:txBody>
+          <a:bodyPr rtlCol="0" anchor="ctr"/>
+          <a:lstStyle/>
+          <a:p>
+            <a:pPr algn="ctr"/>
+            <a:endParaRPr lang="en-US"/>
+          </a:p>
+        </p:txBody>
+      </p:sp>
+      <p:sp>
+        <p:nvSpPr>
+          <p:cNvPr id="18" name="Right Arrow 17"/>
+          <p:cNvSpPr/>
+          <p:nvPr/>
+        </p:nvSpPr>
+        <p:spPr>
+          <a:xfrm>
+            <a:off x="1933575" y="2746177"/>
+            <a:ext cx="876300" cy="180975"/>
+          </a:xfrm>
+          <a:prstGeom prst="rightArrow">
+            <a:avLst/>
+          </a:prstGeom>
+          <a:solidFill>
+            <a:schemeClr val="tx2">
+              <a:lumMod val="40000"/>
+              <a:lumOff val="60000"/>
+            </a:schemeClr>
+          </a:solidFill>
+        </p:spPr>
+        <p:style>
+          <a:lnRef idx="2">
+            <a:schemeClr val="accent1">
+              <a:shade val="50000"/>
+            </a:schemeClr>
+          </a:lnRef>
+          <a:fillRef idx="1">
+            <a:schemeClr val="accent1"/>
+          </a:fillRef>
+          <a:effectRef idx="0">
+            <a:schemeClr val="accent1"/>
+          </a:effectRef>
+          <a:fontRef idx="minor">
+            <a:schemeClr val="lt1"/>
+          </a:fontRef>
+        </p:style>
+        <p:txBody>
+          <a:bodyPr rtlCol="0" anchor="ctr"/>
+          <a:lstStyle/>
+          <a:p>
+            <a:pPr algn="ctr"/>
+            <a:endParaRPr lang="en-US"/>
+          </a:p>
+        </p:txBody>
+      </p:sp>
+      <p:sp>
+        <p:nvSpPr>
+          <p:cNvPr id="19" name="Right Arrow 18"/>
+          <p:cNvSpPr/>
+          <p:nvPr/>
+        </p:nvSpPr>
+        <p:spPr>
+          <a:xfrm>
+            <a:off x="1905000" y="3032552"/>
+            <a:ext cx="914400" cy="228600"/>
+          </a:xfrm>
+          <a:prstGeom prst="rightArrow">
+            <a:avLst/>
+          </a:prstGeom>
+        </p:spPr>
+        <p:style>
+          <a:lnRef idx="2">
+            <a:schemeClr val="accent1">
+              <a:shade val="50000"/>
+            </a:schemeClr>
+          </a:lnRef>
+          <a:fillRef idx="1">
+            <a:schemeClr val="accent1"/>
+          </a:fillRef>
+          <a:effectRef idx="0">
+            <a:schemeClr val="accent1"/>
+          </a:effectRef>
+          <a:fontRef idx="minor">
+            <a:schemeClr val="lt1"/>
+          </a:fontRef>
+        </p:style>
+        <p:txBody>
+          <a:bodyPr rtlCol="0" anchor="ctr"/>
+          <a:lstStyle/>
+          <a:p>
+            <a:pPr algn="ctr"/>
+            <a:endParaRPr lang="en-US"/>
+          </a:p>
+        </p:txBody>
+      </p:sp>
+      <p:sp>
+        <p:nvSpPr>
+          <p:cNvPr id="20" name="Right Arrow 19"/>
+          <p:cNvSpPr/>
+          <p:nvPr/>
+        </p:nvSpPr>
+        <p:spPr>
+          <a:xfrm>
+            <a:off x="1905000" y="3337352"/>
+            <a:ext cx="914400" cy="228600"/>
+          </a:xfrm>
+          <a:prstGeom prst="rightArrow">
+            <a:avLst/>
+          </a:prstGeom>
+        </p:spPr>
+        <p:style>
+          <a:lnRef idx="2">
+            <a:schemeClr val="accent1">
+              <a:shade val="50000"/>
+            </a:schemeClr>
+          </a:lnRef>
+          <a:fillRef idx="1">
+            <a:schemeClr val="accent1"/>
+          </a:fillRef>
+          <a:effectRef idx="0">
+            <a:schemeClr val="accent1"/>
+          </a:effectRef>
+          <a:fontRef idx="minor">
+            <a:schemeClr val="lt1"/>
+          </a:fontRef>
+        </p:style>
+        <p:txBody>
+          <a:bodyPr rtlCol="0" anchor="ctr"/>
+          <a:lstStyle/>
+          <a:p>
+            <a:pPr algn="ctr"/>
+            <a:endParaRPr lang="en-US"/>
+          </a:p>
+        </p:txBody>
+      </p:sp>
+      <p:sp>
+        <p:nvSpPr>
+          <p:cNvPr id="21" name="Right Arrow 20"/>
+          <p:cNvSpPr/>
+          <p:nvPr/>
+        </p:nvSpPr>
+        <p:spPr>
+          <a:xfrm>
+            <a:off x="1905000" y="3642152"/>
+            <a:ext cx="914400" cy="228600"/>
+          </a:xfrm>
+          <a:prstGeom prst="rightArrow">
+            <a:avLst/>
+          </a:prstGeom>
+        </p:spPr>
+        <p:style>
+          <a:lnRef idx="2">
+            <a:schemeClr val="accent1">
+              <a:shade val="50000"/>
+            </a:schemeClr>
+          </a:lnRef>
+          <a:fillRef idx="1">
+            <a:schemeClr val="accent1"/>
+          </a:fillRef>
+          <a:effectRef idx="0">
+            <a:schemeClr val="accent1"/>
+          </a:effectRef>
+          <a:fontRef idx="minor">
+            <a:schemeClr val="lt1"/>
+          </a:fontRef>
+        </p:style>
+        <p:txBody>
+          <a:bodyPr rtlCol="0" anchor="ctr"/>
+          <a:lstStyle/>
+          <a:p>
+            <a:pPr algn="ctr"/>
+            <a:endParaRPr lang="en-US"/>
+          </a:p>
+        </p:txBody>
+      </p:sp>
+      <p:sp>
+        <p:nvSpPr>
+          <p:cNvPr id="22" name="TextBox 21"/>
+          <p:cNvSpPr txBox="1"/>
+          <p:nvPr/>
+        </p:nvSpPr>
+        <p:spPr>
+          <a:xfrm>
+            <a:off x="609600" y="2977575"/>
+            <a:ext cx="1866901" cy="338554"/>
+          </a:xfrm>
+          <a:prstGeom prst="rect">
+            <a:avLst/>
+          </a:prstGeom>
+          <a:noFill/>
+        </p:spPr>
+        <p:txBody>
+          <a:bodyPr wrap="square" rtlCol="0">
+            <a:spAutoFit/>
+          </a:bodyPr>
+          <a:lstStyle/>
+          <a:p>
+            <a:r>
+              <a:rPr lang="en-US" sz="1600" dirty="0" smtClean="0"/>
+              <a:t>temperature</a:t>
+            </a:r>
+            <a:endParaRPr lang="en-US" sz="1600" dirty="0"/>
+          </a:p>
+        </p:txBody>
+      </p:sp>
+      <p:sp>
+        <p:nvSpPr>
+          <p:cNvPr id="23" name="TextBox 22"/>
+          <p:cNvSpPr txBox="1"/>
+          <p:nvPr/>
+        </p:nvSpPr>
+        <p:spPr>
+          <a:xfrm>
+            <a:off x="609599" y="3282375"/>
+            <a:ext cx="1857376" cy="584775"/>
+          </a:xfrm>
+          <a:prstGeom prst="rect">
+            <a:avLst/>
+          </a:prstGeom>
+          <a:noFill/>
+        </p:spPr>
+        <p:txBody>
+          <a:bodyPr wrap="square" rtlCol="0">
+            <a:spAutoFit/>
+          </a:bodyPr>
+          <a:lstStyle/>
+          <a:p>
+            <a:r>
+              <a:rPr lang="en-US" sz="1600" dirty="0" err="1" smtClean="0"/>
+              <a:t>low_register</a:t>
+            </a:r>
+            <a:endParaRPr lang="en-US" sz="1600" dirty="0"/>
+          </a:p>
+          <a:p>
+            <a:endParaRPr lang="en-US" sz="1600" dirty="0"/>
+          </a:p>
+        </p:txBody>
+      </p:sp>
+      <p:sp>
+        <p:nvSpPr>
+          <p:cNvPr id="24" name="TextBox 23"/>
+          <p:cNvSpPr txBox="1"/>
+          <p:nvPr/>
+        </p:nvSpPr>
+        <p:spPr>
+          <a:xfrm>
+            <a:off x="533400" y="3587175"/>
+            <a:ext cx="1828800" cy="584775"/>
+          </a:xfrm>
+          <a:prstGeom prst="rect">
+            <a:avLst/>
+          </a:prstGeom>
+          <a:noFill/>
+        </p:spPr>
+        <p:txBody>
+          <a:bodyPr wrap="square" rtlCol="0">
+            <a:spAutoFit/>
+          </a:bodyPr>
+          <a:lstStyle/>
+          <a:p>
+            <a:r>
+              <a:rPr lang="en-US" sz="1600" dirty="0" err="1"/>
+              <a:t>h</a:t>
+            </a:r>
+            <a:r>
+              <a:rPr lang="en-US" sz="1600" dirty="0" err="1" smtClean="0"/>
+              <a:t>igh_register</a:t>
+            </a:r>
+            <a:endParaRPr lang="en-US" sz="1600" dirty="0"/>
+          </a:p>
+          <a:p>
+            <a:endParaRPr lang="en-US" sz="1600" dirty="0"/>
+          </a:p>
+        </p:txBody>
+      </p:sp>
+      <p:sp>
+        <p:nvSpPr>
+          <p:cNvPr id="25" name="Right Arrow 24"/>
+          <p:cNvSpPr/>
+          <p:nvPr/>
+        </p:nvSpPr>
+        <p:spPr>
+          <a:xfrm>
+            <a:off x="5943600" y="2707273"/>
+            <a:ext cx="990600" cy="304800"/>
+          </a:xfrm>
+          <a:prstGeom prst="rightArrow">
+            <a:avLst/>
+          </a:prstGeom>
+        </p:spPr>
+        <p:style>
+          <a:lnRef idx="2">
+            <a:schemeClr val="accent1">
+              <a:shade val="50000"/>
+            </a:schemeClr>
+          </a:lnRef>
+          <a:fillRef idx="1">
+            <a:schemeClr val="accent1"/>
+          </a:fillRef>
+          <a:effectRef idx="0">
+            <a:schemeClr val="accent1"/>
+          </a:effectRef>
+          <a:fontRef idx="minor">
+            <a:schemeClr val="lt1"/>
+          </a:fontRef>
+        </p:style>
+        <p:txBody>
+          <a:bodyPr rtlCol="0" anchor="ctr"/>
+          <a:lstStyle/>
+          <a:p>
+            <a:pPr algn="ctr"/>
+            <a:endParaRPr lang="en-US"/>
+          </a:p>
+        </p:txBody>
+      </p:sp>
+      <p:sp>
+        <p:nvSpPr>
+          <p:cNvPr id="26" name="TextBox 25"/>
+          <p:cNvSpPr txBox="1"/>
+          <p:nvPr/>
+        </p:nvSpPr>
+        <p:spPr>
+          <a:xfrm>
+            <a:off x="6934200" y="2690396"/>
+            <a:ext cx="1752600" cy="338554"/>
+          </a:xfrm>
+          <a:prstGeom prst="rect">
+            <a:avLst/>
+          </a:prstGeom>
+          <a:noFill/>
+        </p:spPr>
+        <p:txBody>
+          <a:bodyPr wrap="square" rtlCol="0">
+            <a:spAutoFit/>
+          </a:bodyPr>
+          <a:lstStyle/>
+          <a:p>
+            <a:r>
+              <a:rPr lang="en-US" sz="1600" dirty="0" err="1"/>
+              <a:t>s</a:t>
+            </a:r>
+            <a:r>
+              <a:rPr lang="en-US" sz="1600" dirty="0" err="1" smtClean="0"/>
+              <a:t>tatus_register</a:t>
+            </a:r>
+            <a:endParaRPr lang="en-US" sz="1600" dirty="0"/>
+          </a:p>
+        </p:txBody>
+      </p:sp>
+    </p:spTree>
+    <p:extLst>
+      <p:ext uri="{BB962C8B-B14F-4D97-AF65-F5344CB8AC3E}">
+        <p14:creationId xmlns:p14="http://schemas.microsoft.com/office/powerpoint/2010/main" val="208016691"/>
       </p:ext>
     </p:extLst>
   </p:cSld>
@@ -8161,7 +10694,7 @@
           <p:cNvPr id="2" name="Title 1">
             <a:extLst>
               <a:ext uri="{FF2B5EF4-FFF2-40B4-BE49-F238E27FC236}">
-                <a16:creationId xmlns="" xmlns:a16="http://schemas.microsoft.com/office/drawing/2014/main" id="{B460CC8F-45B3-4F56-B96B-074DA4F7B051}"/>
+                <a16:creationId xmlns:a16="http://schemas.microsoft.com/office/drawing/2014/main" xmlns="" id="{B460CC8F-45B3-4F56-B96B-074DA4F7B051}"/>
               </a:ext>
             </a:extLst>
           </p:cNvPr>
@@ -8196,7 +10729,7 @@
           <p:cNvPr id="3" name="Rectangle 2">
             <a:extLst>
               <a:ext uri="{FF2B5EF4-FFF2-40B4-BE49-F238E27FC236}">
-                <a16:creationId xmlns="" xmlns:a16="http://schemas.microsoft.com/office/drawing/2014/main" id="{ACE956A0-8318-4D63-BF9B-E4690D740900}"/>
+                <a16:creationId xmlns:a16="http://schemas.microsoft.com/office/drawing/2014/main" xmlns="" id="{ACE956A0-8318-4D63-BF9B-E4690D740900}"/>
               </a:ext>
             </a:extLst>
           </p:cNvPr>
@@ -8249,7 +10782,7 @@
           <p:cNvPr id="4" name="Rectangle 3">
             <a:extLst>
               <a:ext uri="{FF2B5EF4-FFF2-40B4-BE49-F238E27FC236}">
-                <a16:creationId xmlns="" xmlns:a16="http://schemas.microsoft.com/office/drawing/2014/main" id="{A3305814-7777-46E4-8A3C-D974C10B93DC}"/>
+                <a16:creationId xmlns:a16="http://schemas.microsoft.com/office/drawing/2014/main" xmlns="" id="{A3305814-7777-46E4-8A3C-D974C10B93DC}"/>
               </a:ext>
             </a:extLst>
           </p:cNvPr>
@@ -8302,7 +10835,7 @@
           <p:cNvPr id="5" name="Rectangle 4">
             <a:extLst>
               <a:ext uri="{FF2B5EF4-FFF2-40B4-BE49-F238E27FC236}">
-                <a16:creationId xmlns="" xmlns:a16="http://schemas.microsoft.com/office/drawing/2014/main" id="{7ECBD6CF-CE3E-43AE-869F-3F14CB9633FD}"/>
+                <a16:creationId xmlns:a16="http://schemas.microsoft.com/office/drawing/2014/main" xmlns="" id="{7ECBD6CF-CE3E-43AE-869F-3F14CB9633FD}"/>
               </a:ext>
             </a:extLst>
           </p:cNvPr>
@@ -8355,7 +10888,7 @@
           <p:cNvPr id="6" name="Rectangle 5">
             <a:extLst>
               <a:ext uri="{FF2B5EF4-FFF2-40B4-BE49-F238E27FC236}">
-                <a16:creationId xmlns="" xmlns:a16="http://schemas.microsoft.com/office/drawing/2014/main" id="{E512132D-A629-4C51-ADB0-4BD1E993475E}"/>
+                <a16:creationId xmlns:a16="http://schemas.microsoft.com/office/drawing/2014/main" xmlns="" id="{E512132D-A629-4C51-ADB0-4BD1E993475E}"/>
               </a:ext>
             </a:extLst>
           </p:cNvPr>
@@ -8416,7 +10949,7 @@
           <p:cNvPr id="7" name="Rectangle 6">
             <a:extLst>
               <a:ext uri="{FF2B5EF4-FFF2-40B4-BE49-F238E27FC236}">
-                <a16:creationId xmlns="" xmlns:a16="http://schemas.microsoft.com/office/drawing/2014/main" id="{C1B8A02F-7E41-49E3-B9FB-D5DC7AAE109F}"/>
+                <a16:creationId xmlns:a16="http://schemas.microsoft.com/office/drawing/2014/main" xmlns="" id="{C1B8A02F-7E41-49E3-B9FB-D5DC7AAE109F}"/>
               </a:ext>
             </a:extLst>
           </p:cNvPr>
@@ -8477,7 +11010,7 @@
           <p:cNvPr id="9" name="Rectangle 8">
             <a:extLst>
               <a:ext uri="{FF2B5EF4-FFF2-40B4-BE49-F238E27FC236}">
-                <a16:creationId xmlns="" xmlns:a16="http://schemas.microsoft.com/office/drawing/2014/main" id="{FAEB0CA7-9C3C-4897-BF73-0E042D3EDE24}"/>
+                <a16:creationId xmlns:a16="http://schemas.microsoft.com/office/drawing/2014/main" xmlns="" id="{FAEB0CA7-9C3C-4897-BF73-0E042D3EDE24}"/>
               </a:ext>
             </a:extLst>
           </p:cNvPr>
@@ -8543,7 +11076,7 @@
           <p:cNvPr id="10" name="Hexagon 9">
             <a:extLst>
               <a:ext uri="{FF2B5EF4-FFF2-40B4-BE49-F238E27FC236}">
-                <a16:creationId xmlns="" xmlns:a16="http://schemas.microsoft.com/office/drawing/2014/main" id="{CA87945D-2121-491C-BD10-5BE800C8F8B3}"/>
+                <a16:creationId xmlns:a16="http://schemas.microsoft.com/office/drawing/2014/main" xmlns="" id="{CA87945D-2121-491C-BD10-5BE800C8F8B3}"/>
               </a:ext>
             </a:extLst>
           </p:cNvPr>
@@ -8604,7 +11137,7 @@
           <p:cNvPr id="11" name="Rectangle 10">
             <a:extLst>
               <a:ext uri="{FF2B5EF4-FFF2-40B4-BE49-F238E27FC236}">
-                <a16:creationId xmlns="" xmlns:a16="http://schemas.microsoft.com/office/drawing/2014/main" id="{DC67FBFE-E83D-4D6B-9E73-379C55D6E8E9}"/>
+                <a16:creationId xmlns:a16="http://schemas.microsoft.com/office/drawing/2014/main" xmlns="" id="{DC67FBFE-E83D-4D6B-9E73-379C55D6E8E9}"/>
               </a:ext>
             </a:extLst>
           </p:cNvPr>
@@ -8665,7 +11198,7 @@
           <p:cNvPr id="12" name="Rectangle 11">
             <a:extLst>
               <a:ext uri="{FF2B5EF4-FFF2-40B4-BE49-F238E27FC236}">
-                <a16:creationId xmlns="" xmlns:a16="http://schemas.microsoft.com/office/drawing/2014/main" id="{692C22EF-04C2-4777-A10C-9DDD5797D2DC}"/>
+                <a16:creationId xmlns:a16="http://schemas.microsoft.com/office/drawing/2014/main" xmlns="" id="{692C22EF-04C2-4777-A10C-9DDD5797D2DC}"/>
               </a:ext>
             </a:extLst>
           </p:cNvPr>
@@ -8726,7 +11259,7 @@
           <p:cNvPr id="13" name="Rectangle 12">
             <a:extLst>
               <a:ext uri="{FF2B5EF4-FFF2-40B4-BE49-F238E27FC236}">
-                <a16:creationId xmlns="" xmlns:a16="http://schemas.microsoft.com/office/drawing/2014/main" id="{120F7ABF-14DB-4AD6-9147-255363F81855}"/>
+                <a16:creationId xmlns:a16="http://schemas.microsoft.com/office/drawing/2014/main" xmlns="" id="{120F7ABF-14DB-4AD6-9147-255363F81855}"/>
               </a:ext>
             </a:extLst>
           </p:cNvPr>
@@ -8787,7 +11320,7 @@
           <p:cNvPr id="14" name="Rectangle 13">
             <a:extLst>
               <a:ext uri="{FF2B5EF4-FFF2-40B4-BE49-F238E27FC236}">
-                <a16:creationId xmlns="" xmlns:a16="http://schemas.microsoft.com/office/drawing/2014/main" id="{E1DF5621-D1D8-45E7-BB2D-42AC349D690E}"/>
+                <a16:creationId xmlns:a16="http://schemas.microsoft.com/office/drawing/2014/main" xmlns="" id="{E1DF5621-D1D8-45E7-BB2D-42AC349D690E}"/>
               </a:ext>
             </a:extLst>
           </p:cNvPr>
@@ -8848,7 +11381,7 @@
           <p:cNvPr id="15" name="Oval 14">
             <a:extLst>
               <a:ext uri="{FF2B5EF4-FFF2-40B4-BE49-F238E27FC236}">
-                <a16:creationId xmlns="" xmlns:a16="http://schemas.microsoft.com/office/drawing/2014/main" id="{6E507259-5D23-4FD1-A1A1-4EA55DBD559B}"/>
+                <a16:creationId xmlns:a16="http://schemas.microsoft.com/office/drawing/2014/main" xmlns="" id="{6E507259-5D23-4FD1-A1A1-4EA55DBD559B}"/>
               </a:ext>
             </a:extLst>
           </p:cNvPr>
@@ -8909,7 +11442,7 @@
           <p:cNvPr id="16" name="Rectangle 15">
             <a:extLst>
               <a:ext uri="{FF2B5EF4-FFF2-40B4-BE49-F238E27FC236}">
-                <a16:creationId xmlns="" xmlns:a16="http://schemas.microsoft.com/office/drawing/2014/main" id="{860D3F87-9550-4719-9CE9-57F49545A8E9}"/>
+                <a16:creationId xmlns:a16="http://schemas.microsoft.com/office/drawing/2014/main" xmlns="" id="{860D3F87-9550-4719-9CE9-57F49545A8E9}"/>
               </a:ext>
             </a:extLst>
           </p:cNvPr>
@@ -8970,7 +11503,7 @@
           <p:cNvPr id="17" name="Flowchart: Manual Operation 16">
             <a:extLst>
               <a:ext uri="{FF2B5EF4-FFF2-40B4-BE49-F238E27FC236}">
-                <a16:creationId xmlns="" xmlns:a16="http://schemas.microsoft.com/office/drawing/2014/main" id="{00677D04-9560-4144-A62F-13DB461F21E0}"/>
+                <a16:creationId xmlns:a16="http://schemas.microsoft.com/office/drawing/2014/main" xmlns="" id="{00677D04-9560-4144-A62F-13DB461F21E0}"/>
               </a:ext>
             </a:extLst>
           </p:cNvPr>
@@ -9036,7 +11569,7 @@
           <p:cNvPr id="18" name="Flowchart: Manual Operation 17">
             <a:extLst>
               <a:ext uri="{FF2B5EF4-FFF2-40B4-BE49-F238E27FC236}">
-                <a16:creationId xmlns="" xmlns:a16="http://schemas.microsoft.com/office/drawing/2014/main" id="{C573388D-B1B8-4269-8A6E-4042E7E8568C}"/>
+                <a16:creationId xmlns:a16="http://schemas.microsoft.com/office/drawing/2014/main" xmlns="" id="{C573388D-B1B8-4269-8A6E-4042E7E8568C}"/>
               </a:ext>
             </a:extLst>
           </p:cNvPr>
@@ -9097,7 +11630,7 @@
           <p:cNvPr id="19" name="Rectangle 18">
             <a:extLst>
               <a:ext uri="{FF2B5EF4-FFF2-40B4-BE49-F238E27FC236}">
-                <a16:creationId xmlns="" xmlns:a16="http://schemas.microsoft.com/office/drawing/2014/main" id="{E64A1C4A-4892-4B0F-A015-F7EB1E9D1D1E}"/>
+                <a16:creationId xmlns:a16="http://schemas.microsoft.com/office/drawing/2014/main" xmlns="" id="{E64A1C4A-4892-4B0F-A015-F7EB1E9D1D1E}"/>
               </a:ext>
             </a:extLst>
           </p:cNvPr>
@@ -9158,7 +11691,7 @@
           <p:cNvPr id="20" name="Rectangle 19">
             <a:extLst>
               <a:ext uri="{FF2B5EF4-FFF2-40B4-BE49-F238E27FC236}">
-                <a16:creationId xmlns="" xmlns:a16="http://schemas.microsoft.com/office/drawing/2014/main" id="{B7869C3A-9A69-49BE-8724-32F5A3BEB8BC}"/>
+                <a16:creationId xmlns:a16="http://schemas.microsoft.com/office/drawing/2014/main" xmlns="" id="{B7869C3A-9A69-49BE-8724-32F5A3BEB8BC}"/>
               </a:ext>
             </a:extLst>
           </p:cNvPr>
@@ -9211,7 +11744,7 @@
           <p:cNvPr id="23" name="Straight Connector 22">
             <a:extLst>
               <a:ext uri="{FF2B5EF4-FFF2-40B4-BE49-F238E27FC236}">
-                <a16:creationId xmlns="" xmlns:a16="http://schemas.microsoft.com/office/drawing/2014/main" id="{4A1C1DCC-39D1-41B6-A2A8-782C8D57112F}"/>
+                <a16:creationId xmlns:a16="http://schemas.microsoft.com/office/drawing/2014/main" xmlns="" id="{4A1C1DCC-39D1-41B6-A2A8-782C8D57112F}"/>
               </a:ext>
             </a:extLst>
           </p:cNvPr>
@@ -9254,7 +11787,7 @@
           <p:cNvPr id="24" name="Straight Connector 23">
             <a:extLst>
               <a:ext uri="{FF2B5EF4-FFF2-40B4-BE49-F238E27FC236}">
-                <a16:creationId xmlns="" xmlns:a16="http://schemas.microsoft.com/office/drawing/2014/main" id="{B59354B1-7B33-4C0D-9C4B-EB0FF74D280C}"/>
+                <a16:creationId xmlns:a16="http://schemas.microsoft.com/office/drawing/2014/main" xmlns="" id="{B59354B1-7B33-4C0D-9C4B-EB0FF74D280C}"/>
               </a:ext>
             </a:extLst>
           </p:cNvPr>
@@ -9301,7 +11834,7 @@
           <p:cNvPr id="27" name="Straight Connector 26">
             <a:extLst>
               <a:ext uri="{FF2B5EF4-FFF2-40B4-BE49-F238E27FC236}">
-                <a16:creationId xmlns="" xmlns:a16="http://schemas.microsoft.com/office/drawing/2014/main" id="{D122C726-7DDA-4CC4-9FBA-6D3667E89E0E}"/>
+                <a16:creationId xmlns:a16="http://schemas.microsoft.com/office/drawing/2014/main" xmlns="" id="{D122C726-7DDA-4CC4-9FBA-6D3667E89E0E}"/>
               </a:ext>
             </a:extLst>
           </p:cNvPr>
@@ -9348,7 +11881,7 @@
           <p:cNvPr id="30" name="Straight Connector 29">
             <a:extLst>
               <a:ext uri="{FF2B5EF4-FFF2-40B4-BE49-F238E27FC236}">
-                <a16:creationId xmlns="" xmlns:a16="http://schemas.microsoft.com/office/drawing/2014/main" id="{51B9CC44-49D9-4793-A46E-41398B36DC1E}"/>
+                <a16:creationId xmlns:a16="http://schemas.microsoft.com/office/drawing/2014/main" xmlns="" id="{51B9CC44-49D9-4793-A46E-41398B36DC1E}"/>
               </a:ext>
             </a:extLst>
           </p:cNvPr>
@@ -9394,7 +11927,7 @@
           <p:cNvPr id="33" name="Straight Connector 32">
             <a:extLst>
               <a:ext uri="{FF2B5EF4-FFF2-40B4-BE49-F238E27FC236}">
-                <a16:creationId xmlns="" xmlns:a16="http://schemas.microsoft.com/office/drawing/2014/main" id="{DDDE8180-B217-4F93-B710-79A1C1AC1246}"/>
+                <a16:creationId xmlns:a16="http://schemas.microsoft.com/office/drawing/2014/main" xmlns="" id="{DDDE8180-B217-4F93-B710-79A1C1AC1246}"/>
               </a:ext>
             </a:extLst>
           </p:cNvPr>
@@ -9438,7 +11971,7 @@
           <p:cNvPr id="40" name="Straight Connector 39">
             <a:extLst>
               <a:ext uri="{FF2B5EF4-FFF2-40B4-BE49-F238E27FC236}">
-                <a16:creationId xmlns="" xmlns:a16="http://schemas.microsoft.com/office/drawing/2014/main" id="{9F27CCCD-208C-45D6-8AEB-2B3CC93B962D}"/>
+                <a16:creationId xmlns:a16="http://schemas.microsoft.com/office/drawing/2014/main" xmlns="" id="{9F27CCCD-208C-45D6-8AEB-2B3CC93B962D}"/>
               </a:ext>
             </a:extLst>
           </p:cNvPr>
@@ -9483,7 +12016,7 @@
           <p:cNvPr id="43" name="Straight Connector 42">
             <a:extLst>
               <a:ext uri="{FF2B5EF4-FFF2-40B4-BE49-F238E27FC236}">
-                <a16:creationId xmlns="" xmlns:a16="http://schemas.microsoft.com/office/drawing/2014/main" id="{15C7B7DD-D47C-4712-948A-04A28217B8B9}"/>
+                <a16:creationId xmlns:a16="http://schemas.microsoft.com/office/drawing/2014/main" xmlns="" id="{15C7B7DD-D47C-4712-948A-04A28217B8B9}"/>
               </a:ext>
             </a:extLst>
           </p:cNvPr>
@@ -9526,7 +12059,7 @@
           <p:cNvPr id="47" name="Straight Connector 46">
             <a:extLst>
               <a:ext uri="{FF2B5EF4-FFF2-40B4-BE49-F238E27FC236}">
-                <a16:creationId xmlns="" xmlns:a16="http://schemas.microsoft.com/office/drawing/2014/main" id="{5E48962E-4DC7-4224-9374-FA8DBAEAFC5E}"/>
+                <a16:creationId xmlns:a16="http://schemas.microsoft.com/office/drawing/2014/main" xmlns="" id="{5E48962E-4DC7-4224-9374-FA8DBAEAFC5E}"/>
               </a:ext>
             </a:extLst>
           </p:cNvPr>
@@ -9570,7 +12103,7 @@
           <p:cNvPr id="50" name="Straight Connector 49">
             <a:extLst>
               <a:ext uri="{FF2B5EF4-FFF2-40B4-BE49-F238E27FC236}">
-                <a16:creationId xmlns="" xmlns:a16="http://schemas.microsoft.com/office/drawing/2014/main" id="{8A4B7A18-AEFE-472C-B94F-8A758BD424B9}"/>
+                <a16:creationId xmlns:a16="http://schemas.microsoft.com/office/drawing/2014/main" xmlns="" id="{8A4B7A18-AEFE-472C-B94F-8A758BD424B9}"/>
               </a:ext>
             </a:extLst>
           </p:cNvPr>
@@ -9613,7 +12146,7 @@
           <p:cNvPr id="52" name="Straight Connector 51">
             <a:extLst>
               <a:ext uri="{FF2B5EF4-FFF2-40B4-BE49-F238E27FC236}">
-                <a16:creationId xmlns="" xmlns:a16="http://schemas.microsoft.com/office/drawing/2014/main" id="{10C6C995-B386-46BD-B752-65677D45DFB5}"/>
+                <a16:creationId xmlns:a16="http://schemas.microsoft.com/office/drawing/2014/main" xmlns="" id="{10C6C995-B386-46BD-B752-65677D45DFB5}"/>
               </a:ext>
             </a:extLst>
           </p:cNvPr>
@@ -9658,7 +12191,7 @@
           <p:cNvPr id="53" name="Straight Connector 52">
             <a:extLst>
               <a:ext uri="{FF2B5EF4-FFF2-40B4-BE49-F238E27FC236}">
-                <a16:creationId xmlns="" xmlns:a16="http://schemas.microsoft.com/office/drawing/2014/main" id="{45AAB429-C319-43DD-AC81-0CF71A11B288}"/>
+                <a16:creationId xmlns:a16="http://schemas.microsoft.com/office/drawing/2014/main" xmlns="" id="{45AAB429-C319-43DD-AC81-0CF71A11B288}"/>
               </a:ext>
             </a:extLst>
           </p:cNvPr>
@@ -9701,7 +12234,7 @@
           <p:cNvPr id="56" name="Straight Connector 55">
             <a:extLst>
               <a:ext uri="{FF2B5EF4-FFF2-40B4-BE49-F238E27FC236}">
-                <a16:creationId xmlns="" xmlns:a16="http://schemas.microsoft.com/office/drawing/2014/main" id="{BE47D13D-F6C1-4DAD-831E-9A73E22F0532}"/>
+                <a16:creationId xmlns:a16="http://schemas.microsoft.com/office/drawing/2014/main" xmlns="" id="{BE47D13D-F6C1-4DAD-831E-9A73E22F0532}"/>
               </a:ext>
             </a:extLst>
           </p:cNvPr>
@@ -9747,7 +12280,7 @@
           <p:cNvPr id="60" name="Straight Connector 59">
             <a:extLst>
               <a:ext uri="{FF2B5EF4-FFF2-40B4-BE49-F238E27FC236}">
-                <a16:creationId xmlns="" xmlns:a16="http://schemas.microsoft.com/office/drawing/2014/main" id="{08E83484-D235-4945-831C-5A53BAC10D36}"/>
+                <a16:creationId xmlns:a16="http://schemas.microsoft.com/office/drawing/2014/main" xmlns="" id="{08E83484-D235-4945-831C-5A53BAC10D36}"/>
               </a:ext>
             </a:extLst>
           </p:cNvPr>
@@ -9790,7 +12323,7 @@
           <p:cNvPr id="62" name="Straight Connector 61">
             <a:extLst>
               <a:ext uri="{FF2B5EF4-FFF2-40B4-BE49-F238E27FC236}">
-                <a16:creationId xmlns="" xmlns:a16="http://schemas.microsoft.com/office/drawing/2014/main" id="{AA2EDACA-B066-4CC2-A49F-DFFEFB7EE053}"/>
+                <a16:creationId xmlns:a16="http://schemas.microsoft.com/office/drawing/2014/main" xmlns="" id="{AA2EDACA-B066-4CC2-A49F-DFFEFB7EE053}"/>
               </a:ext>
             </a:extLst>
           </p:cNvPr>
@@ -9835,7 +12368,7 @@
           <p:cNvPr id="70" name="Straight Connector 69">
             <a:extLst>
               <a:ext uri="{FF2B5EF4-FFF2-40B4-BE49-F238E27FC236}">
-                <a16:creationId xmlns="" xmlns:a16="http://schemas.microsoft.com/office/drawing/2014/main" id="{D9CCC378-CC11-4B88-8FBE-D5E714F7A59B}"/>
+                <a16:creationId xmlns:a16="http://schemas.microsoft.com/office/drawing/2014/main" xmlns="" id="{D9CCC378-CC11-4B88-8FBE-D5E714F7A59B}"/>
               </a:ext>
             </a:extLst>
           </p:cNvPr>
@@ -9879,7 +12412,7 @@
           <p:cNvPr id="75" name="Straight Connector 74">
             <a:extLst>
               <a:ext uri="{FF2B5EF4-FFF2-40B4-BE49-F238E27FC236}">
-                <a16:creationId xmlns="" xmlns:a16="http://schemas.microsoft.com/office/drawing/2014/main" id="{67AC1AB2-9A1D-4198-98B3-72B1DB88DD4D}"/>
+                <a16:creationId xmlns:a16="http://schemas.microsoft.com/office/drawing/2014/main" xmlns="" id="{67AC1AB2-9A1D-4198-98B3-72B1DB88DD4D}"/>
               </a:ext>
             </a:extLst>
           </p:cNvPr>
@@ -9924,7 +12457,7 @@
           <p:cNvPr id="83" name="Straight Connector 82">
             <a:extLst>
               <a:ext uri="{FF2B5EF4-FFF2-40B4-BE49-F238E27FC236}">
-                <a16:creationId xmlns="" xmlns:a16="http://schemas.microsoft.com/office/drawing/2014/main" id="{1C20412D-804B-4A67-BA2C-C1D840A9C89B}"/>
+                <a16:creationId xmlns:a16="http://schemas.microsoft.com/office/drawing/2014/main" xmlns="" id="{1C20412D-804B-4A67-BA2C-C1D840A9C89B}"/>
               </a:ext>
             </a:extLst>
           </p:cNvPr>
@@ -9969,7 +12502,7 @@
           <p:cNvPr id="87" name="Straight Connector 86">
             <a:extLst>
               <a:ext uri="{FF2B5EF4-FFF2-40B4-BE49-F238E27FC236}">
-                <a16:creationId xmlns="" xmlns:a16="http://schemas.microsoft.com/office/drawing/2014/main" id="{67A9B0DF-248C-4E38-9ECB-D85F3FC79AB2}"/>
+                <a16:creationId xmlns:a16="http://schemas.microsoft.com/office/drawing/2014/main" xmlns="" id="{67A9B0DF-248C-4E38-9ECB-D85F3FC79AB2}"/>
               </a:ext>
             </a:extLst>
           </p:cNvPr>
@@ -10015,7 +12548,7 @@
           <p:cNvPr id="89" name="Straight Connector 88">
             <a:extLst>
               <a:ext uri="{FF2B5EF4-FFF2-40B4-BE49-F238E27FC236}">
-                <a16:creationId xmlns="" xmlns:a16="http://schemas.microsoft.com/office/drawing/2014/main" id="{3E44E9CE-AA91-478E-9C8D-D818639F82C8}"/>
+                <a16:creationId xmlns:a16="http://schemas.microsoft.com/office/drawing/2014/main" xmlns="" id="{3E44E9CE-AA91-478E-9C8D-D818639F82C8}"/>
               </a:ext>
             </a:extLst>
           </p:cNvPr>
@@ -10061,7 +12594,7 @@
           <p:cNvPr id="93" name="Straight Connector 92">
             <a:extLst>
               <a:ext uri="{FF2B5EF4-FFF2-40B4-BE49-F238E27FC236}">
-                <a16:creationId xmlns="" xmlns:a16="http://schemas.microsoft.com/office/drawing/2014/main" id="{D56BB4F0-E4A9-478F-B72D-0A423C63D882}"/>
+                <a16:creationId xmlns:a16="http://schemas.microsoft.com/office/drawing/2014/main" xmlns="" id="{D56BB4F0-E4A9-478F-B72D-0A423C63D882}"/>
               </a:ext>
             </a:extLst>
           </p:cNvPr>
@@ -10107,7 +12640,7 @@
           <p:cNvPr id="96" name="Straight Connector 95">
             <a:extLst>
               <a:ext uri="{FF2B5EF4-FFF2-40B4-BE49-F238E27FC236}">
-                <a16:creationId xmlns="" xmlns:a16="http://schemas.microsoft.com/office/drawing/2014/main" id="{AA0CD164-C31B-43BC-BA24-BFCC5FC8608D}"/>
+                <a16:creationId xmlns:a16="http://schemas.microsoft.com/office/drawing/2014/main" xmlns="" id="{AA0CD164-C31B-43BC-BA24-BFCC5FC8608D}"/>
               </a:ext>
             </a:extLst>
           </p:cNvPr>
@@ -10150,7 +12683,7 @@
           <p:cNvPr id="98" name="Straight Connector 97">
             <a:extLst>
               <a:ext uri="{FF2B5EF4-FFF2-40B4-BE49-F238E27FC236}">
-                <a16:creationId xmlns="" xmlns:a16="http://schemas.microsoft.com/office/drawing/2014/main" id="{0B9430B3-C8F8-474F-B86D-78DA9FEA278D}"/>
+                <a16:creationId xmlns:a16="http://schemas.microsoft.com/office/drawing/2014/main" xmlns="" id="{0B9430B3-C8F8-474F-B86D-78DA9FEA278D}"/>
               </a:ext>
             </a:extLst>
           </p:cNvPr>
@@ -10196,7 +12729,7 @@
           <p:cNvPr id="100" name="Straight Connector 99">
             <a:extLst>
               <a:ext uri="{FF2B5EF4-FFF2-40B4-BE49-F238E27FC236}">
-                <a16:creationId xmlns="" xmlns:a16="http://schemas.microsoft.com/office/drawing/2014/main" id="{06F18415-B04E-421C-926B-8B7283C52826}"/>
+                <a16:creationId xmlns:a16="http://schemas.microsoft.com/office/drawing/2014/main" xmlns="" id="{06F18415-B04E-421C-926B-8B7283C52826}"/>
               </a:ext>
             </a:extLst>
           </p:cNvPr>
@@ -10242,7 +12775,7 @@
           <p:cNvPr id="102" name="Straight Connector 101">
             <a:extLst>
               <a:ext uri="{FF2B5EF4-FFF2-40B4-BE49-F238E27FC236}">
-                <a16:creationId xmlns="" xmlns:a16="http://schemas.microsoft.com/office/drawing/2014/main" id="{CA7DB370-6CE6-45C8-845C-180D7D8F841C}"/>
+                <a16:creationId xmlns:a16="http://schemas.microsoft.com/office/drawing/2014/main" xmlns="" id="{CA7DB370-6CE6-45C8-845C-180D7D8F841C}"/>
               </a:ext>
             </a:extLst>
           </p:cNvPr>
@@ -10289,7 +12822,7 @@
           <p:cNvPr id="106" name="Straight Connector 105">
             <a:extLst>
               <a:ext uri="{FF2B5EF4-FFF2-40B4-BE49-F238E27FC236}">
-                <a16:creationId xmlns="" xmlns:a16="http://schemas.microsoft.com/office/drawing/2014/main" id="{A99860B6-CD7F-4722-8778-E778BDCE5A9C}"/>
+                <a16:creationId xmlns:a16="http://schemas.microsoft.com/office/drawing/2014/main" xmlns="" id="{A99860B6-CD7F-4722-8778-E778BDCE5A9C}"/>
               </a:ext>
             </a:extLst>
           </p:cNvPr>
@@ -10335,7 +12868,7 @@
           <p:cNvPr id="109" name="Straight Connector 108">
             <a:extLst>
               <a:ext uri="{FF2B5EF4-FFF2-40B4-BE49-F238E27FC236}">
-                <a16:creationId xmlns="" xmlns:a16="http://schemas.microsoft.com/office/drawing/2014/main" id="{2C04FE35-9594-44B2-97B6-456866A713C5}"/>
+                <a16:creationId xmlns:a16="http://schemas.microsoft.com/office/drawing/2014/main" xmlns="" id="{2C04FE35-9594-44B2-97B6-456866A713C5}"/>
               </a:ext>
             </a:extLst>
           </p:cNvPr>
@@ -10378,7 +12911,7 @@
           <p:cNvPr id="111" name="Straight Connector 110">
             <a:extLst>
               <a:ext uri="{FF2B5EF4-FFF2-40B4-BE49-F238E27FC236}">
-                <a16:creationId xmlns="" xmlns:a16="http://schemas.microsoft.com/office/drawing/2014/main" id="{AB77ADA8-D7E6-43B8-8B78-7157BC58D943}"/>
+                <a16:creationId xmlns:a16="http://schemas.microsoft.com/office/drawing/2014/main" xmlns="" id="{AB77ADA8-D7E6-43B8-8B78-7157BC58D943}"/>
               </a:ext>
             </a:extLst>
           </p:cNvPr>
@@ -10421,7 +12954,7 @@
           <p:cNvPr id="112" name="Straight Connector 111">
             <a:extLst>
               <a:ext uri="{FF2B5EF4-FFF2-40B4-BE49-F238E27FC236}">
-                <a16:creationId xmlns="" xmlns:a16="http://schemas.microsoft.com/office/drawing/2014/main" id="{2D82AAA5-D72A-4C67-80AB-6C3CC26BDE6A}"/>
+                <a16:creationId xmlns:a16="http://schemas.microsoft.com/office/drawing/2014/main" xmlns="" id="{2D82AAA5-D72A-4C67-80AB-6C3CC26BDE6A}"/>
               </a:ext>
             </a:extLst>
           </p:cNvPr>
@@ -10465,7 +12998,7 @@
           <p:cNvPr id="117" name="Straight Connector 116">
             <a:extLst>
               <a:ext uri="{FF2B5EF4-FFF2-40B4-BE49-F238E27FC236}">
-                <a16:creationId xmlns="" xmlns:a16="http://schemas.microsoft.com/office/drawing/2014/main" id="{1DC59837-2467-4873-B968-F9B21C31F328}"/>
+                <a16:creationId xmlns:a16="http://schemas.microsoft.com/office/drawing/2014/main" xmlns="" id="{1DC59837-2467-4873-B968-F9B21C31F328}"/>
               </a:ext>
             </a:extLst>
           </p:cNvPr>
@@ -10510,7 +13043,7 @@
           <p:cNvPr id="120" name="Straight Connector 119">
             <a:extLst>
               <a:ext uri="{FF2B5EF4-FFF2-40B4-BE49-F238E27FC236}">
-                <a16:creationId xmlns="" xmlns:a16="http://schemas.microsoft.com/office/drawing/2014/main" id="{D94C89E8-802E-4A6C-A34D-6958E7AC2C46}"/>
+                <a16:creationId xmlns:a16="http://schemas.microsoft.com/office/drawing/2014/main" xmlns="" id="{D94C89E8-802E-4A6C-A34D-6958E7AC2C46}"/>
               </a:ext>
             </a:extLst>
           </p:cNvPr>
@@ -10553,7 +13086,7 @@
           <p:cNvPr id="122" name="Straight Connector 121">
             <a:extLst>
               <a:ext uri="{FF2B5EF4-FFF2-40B4-BE49-F238E27FC236}">
-                <a16:creationId xmlns="" xmlns:a16="http://schemas.microsoft.com/office/drawing/2014/main" id="{4F0507B3-3029-438C-9D61-2D054DD4F964}"/>
+                <a16:creationId xmlns:a16="http://schemas.microsoft.com/office/drawing/2014/main" xmlns="" id="{4F0507B3-3029-438C-9D61-2D054DD4F964}"/>
               </a:ext>
             </a:extLst>
           </p:cNvPr>
@@ -10596,7 +13129,7 @@
           <p:cNvPr id="125" name="Straight Connector 124">
             <a:extLst>
               <a:ext uri="{FF2B5EF4-FFF2-40B4-BE49-F238E27FC236}">
-                <a16:creationId xmlns="" xmlns:a16="http://schemas.microsoft.com/office/drawing/2014/main" id="{7667171E-57F0-49A3-A477-B7A3AF4FCE56}"/>
+                <a16:creationId xmlns:a16="http://schemas.microsoft.com/office/drawing/2014/main" xmlns="" id="{7667171E-57F0-49A3-A477-B7A3AF4FCE56}"/>
               </a:ext>
             </a:extLst>
           </p:cNvPr>
@@ -10639,7 +13172,7 @@
           <p:cNvPr id="127" name="Straight Connector 126">
             <a:extLst>
               <a:ext uri="{FF2B5EF4-FFF2-40B4-BE49-F238E27FC236}">
-                <a16:creationId xmlns="" xmlns:a16="http://schemas.microsoft.com/office/drawing/2014/main" id="{DDEE8051-E06C-41B0-BC7D-4DCCF60CD8FC}"/>
+                <a16:creationId xmlns:a16="http://schemas.microsoft.com/office/drawing/2014/main" xmlns="" id="{DDEE8051-E06C-41B0-BC7D-4DCCF60CD8FC}"/>
               </a:ext>
             </a:extLst>
           </p:cNvPr>
@@ -10684,7 +13217,7 @@
           <p:cNvPr id="132" name="Straight Connector 131">
             <a:extLst>
               <a:ext uri="{FF2B5EF4-FFF2-40B4-BE49-F238E27FC236}">
-                <a16:creationId xmlns="" xmlns:a16="http://schemas.microsoft.com/office/drawing/2014/main" id="{E2205573-4F5B-4B17-B183-80B27EB35132}"/>
+                <a16:creationId xmlns:a16="http://schemas.microsoft.com/office/drawing/2014/main" xmlns="" id="{E2205573-4F5B-4B17-B183-80B27EB35132}"/>
               </a:ext>
             </a:extLst>
           </p:cNvPr>
@@ -10727,7 +13260,7 @@
           <p:cNvPr id="133" name="Straight Connector 132">
             <a:extLst>
               <a:ext uri="{FF2B5EF4-FFF2-40B4-BE49-F238E27FC236}">
-                <a16:creationId xmlns="" xmlns:a16="http://schemas.microsoft.com/office/drawing/2014/main" id="{4C90EC04-DF73-4B82-B1C6-298E85627B10}"/>
+                <a16:creationId xmlns:a16="http://schemas.microsoft.com/office/drawing/2014/main" xmlns="" id="{4C90EC04-DF73-4B82-B1C6-298E85627B10}"/>
               </a:ext>
             </a:extLst>
           </p:cNvPr>
@@ -10770,7 +13303,7 @@
           <p:cNvPr id="135" name="Straight Connector 134">
             <a:extLst>
               <a:ext uri="{FF2B5EF4-FFF2-40B4-BE49-F238E27FC236}">
-                <a16:creationId xmlns="" xmlns:a16="http://schemas.microsoft.com/office/drawing/2014/main" id="{2C2911EF-C3CB-4467-A4CA-56CAA960E264}"/>
+                <a16:creationId xmlns:a16="http://schemas.microsoft.com/office/drawing/2014/main" xmlns="" id="{2C2911EF-C3CB-4467-A4CA-56CAA960E264}"/>
               </a:ext>
             </a:extLst>
           </p:cNvPr>
@@ -10817,7 +13350,7 @@
           <p:cNvPr id="139" name="Straight Connector 138">
             <a:extLst>
               <a:ext uri="{FF2B5EF4-FFF2-40B4-BE49-F238E27FC236}">
-                <a16:creationId xmlns="" xmlns:a16="http://schemas.microsoft.com/office/drawing/2014/main" id="{C073D98C-9840-4ECC-9279-6A779EE95C88}"/>
+                <a16:creationId xmlns:a16="http://schemas.microsoft.com/office/drawing/2014/main" xmlns="" id="{C073D98C-9840-4ECC-9279-6A779EE95C88}"/>
               </a:ext>
             </a:extLst>
           </p:cNvPr>
@@ -10863,7 +13396,7 @@
           <p:cNvPr id="146" name="Straight Connector 145">
             <a:extLst>
               <a:ext uri="{FF2B5EF4-FFF2-40B4-BE49-F238E27FC236}">
-                <a16:creationId xmlns="" xmlns:a16="http://schemas.microsoft.com/office/drawing/2014/main" id="{78231FB9-327D-432E-8027-B0B8E8E4F494}"/>
+                <a16:creationId xmlns:a16="http://schemas.microsoft.com/office/drawing/2014/main" xmlns="" id="{78231FB9-327D-432E-8027-B0B8E8E4F494}"/>
               </a:ext>
             </a:extLst>
           </p:cNvPr>
@@ -10906,7 +13439,7 @@
           <p:cNvPr id="154" name="Flowchart: Manual Operation 153">
             <a:extLst>
               <a:ext uri="{FF2B5EF4-FFF2-40B4-BE49-F238E27FC236}">
-                <a16:creationId xmlns="" xmlns:a16="http://schemas.microsoft.com/office/drawing/2014/main" id="{164190CC-D9A5-4FED-8A62-BB8155AC0449}"/>
+                <a16:creationId xmlns:a16="http://schemas.microsoft.com/office/drawing/2014/main" xmlns="" id="{164190CC-D9A5-4FED-8A62-BB8155AC0449}"/>
               </a:ext>
             </a:extLst>
           </p:cNvPr>
@@ -10967,7 +13500,7 @@
           <p:cNvPr id="155" name="Straight Connector 154">
             <a:extLst>
               <a:ext uri="{FF2B5EF4-FFF2-40B4-BE49-F238E27FC236}">
-                <a16:creationId xmlns="" xmlns:a16="http://schemas.microsoft.com/office/drawing/2014/main" id="{AD4C12EF-F21B-49EC-9D40-6098B98C1FAB}"/>
+                <a16:creationId xmlns:a16="http://schemas.microsoft.com/office/drawing/2014/main" xmlns="" id="{AD4C12EF-F21B-49EC-9D40-6098B98C1FAB}"/>
               </a:ext>
             </a:extLst>
           </p:cNvPr>
@@ -11013,7 +13546,7 @@
           <p:cNvPr id="158" name="Straight Connector 157">
             <a:extLst>
               <a:ext uri="{FF2B5EF4-FFF2-40B4-BE49-F238E27FC236}">
-                <a16:creationId xmlns="" xmlns:a16="http://schemas.microsoft.com/office/drawing/2014/main" id="{9E4257ED-0938-4B5A-83F7-62FDA0C0711D}"/>
+                <a16:creationId xmlns:a16="http://schemas.microsoft.com/office/drawing/2014/main" xmlns="" id="{9E4257ED-0938-4B5A-83F7-62FDA0C0711D}"/>
               </a:ext>
             </a:extLst>
           </p:cNvPr>
@@ -11056,7 +13589,7 @@
           <p:cNvPr id="160" name="Straight Connector 159">
             <a:extLst>
               <a:ext uri="{FF2B5EF4-FFF2-40B4-BE49-F238E27FC236}">
-                <a16:creationId xmlns="" xmlns:a16="http://schemas.microsoft.com/office/drawing/2014/main" id="{0F226DB7-6F08-4CD6-87FA-DFE0042C6BC6}"/>
+                <a16:creationId xmlns:a16="http://schemas.microsoft.com/office/drawing/2014/main" xmlns="" id="{0F226DB7-6F08-4CD6-87FA-DFE0042C6BC6}"/>
               </a:ext>
             </a:extLst>
           </p:cNvPr>
@@ -11102,7 +13635,7 @@
           <p:cNvPr id="161" name="Straight Connector 160">
             <a:extLst>
               <a:ext uri="{FF2B5EF4-FFF2-40B4-BE49-F238E27FC236}">
-                <a16:creationId xmlns="" xmlns:a16="http://schemas.microsoft.com/office/drawing/2014/main" id="{B51CF136-9C51-4F48-9ACC-A5493B797222}"/>
+                <a16:creationId xmlns:a16="http://schemas.microsoft.com/office/drawing/2014/main" xmlns="" id="{B51CF136-9C51-4F48-9ACC-A5493B797222}"/>
               </a:ext>
             </a:extLst>
           </p:cNvPr>
@@ -11149,7 +13682,7 @@
           <p:cNvPr id="162" name="Straight Connector 161">
             <a:extLst>
               <a:ext uri="{FF2B5EF4-FFF2-40B4-BE49-F238E27FC236}">
-                <a16:creationId xmlns="" xmlns:a16="http://schemas.microsoft.com/office/drawing/2014/main" id="{B4FFD801-4103-449A-A949-C18DC6219093}"/>
+                <a16:creationId xmlns:a16="http://schemas.microsoft.com/office/drawing/2014/main" xmlns="" id="{B4FFD801-4103-449A-A949-C18DC6219093}"/>
               </a:ext>
             </a:extLst>
           </p:cNvPr>
@@ -11196,7 +13729,7 @@
           <p:cNvPr id="174" name="Oval 173">
             <a:extLst>
               <a:ext uri="{FF2B5EF4-FFF2-40B4-BE49-F238E27FC236}">
-                <a16:creationId xmlns="" xmlns:a16="http://schemas.microsoft.com/office/drawing/2014/main" id="{19BB33B8-BAEC-4D20-96C9-2E4D54DB810C}"/>
+                <a16:creationId xmlns:a16="http://schemas.microsoft.com/office/drawing/2014/main" xmlns="" id="{19BB33B8-BAEC-4D20-96C9-2E4D54DB810C}"/>
               </a:ext>
             </a:extLst>
           </p:cNvPr>
@@ -11252,7 +13785,7 @@
           <p:cNvPr id="175" name="Oval 174">
             <a:extLst>
               <a:ext uri="{FF2B5EF4-FFF2-40B4-BE49-F238E27FC236}">
-                <a16:creationId xmlns="" xmlns:a16="http://schemas.microsoft.com/office/drawing/2014/main" id="{90CB78A5-3DE1-4A24-A8CC-38B1D4447F6A}"/>
+                <a16:creationId xmlns:a16="http://schemas.microsoft.com/office/drawing/2014/main" xmlns="" id="{90CB78A5-3DE1-4A24-A8CC-38B1D4447F6A}"/>
               </a:ext>
             </a:extLst>
           </p:cNvPr>
@@ -11308,7 +13841,7 @@
           <p:cNvPr id="177" name="Oval 176">
             <a:extLst>
               <a:ext uri="{FF2B5EF4-FFF2-40B4-BE49-F238E27FC236}">
-                <a16:creationId xmlns="" xmlns:a16="http://schemas.microsoft.com/office/drawing/2014/main" id="{A403641E-A3D1-4799-B0FA-AED9245FFF88}"/>
+                <a16:creationId xmlns:a16="http://schemas.microsoft.com/office/drawing/2014/main" xmlns="" id="{A403641E-A3D1-4799-B0FA-AED9245FFF88}"/>
               </a:ext>
             </a:extLst>
           </p:cNvPr>
@@ -11364,7 +13897,7 @@
           <p:cNvPr id="181" name="Straight Connector 180">
             <a:extLst>
               <a:ext uri="{FF2B5EF4-FFF2-40B4-BE49-F238E27FC236}">
-                <a16:creationId xmlns="" xmlns:a16="http://schemas.microsoft.com/office/drawing/2014/main" id="{66A81A91-F413-4E60-80E8-570B5CE8422F}"/>
+                <a16:creationId xmlns:a16="http://schemas.microsoft.com/office/drawing/2014/main" xmlns="" id="{66A81A91-F413-4E60-80E8-570B5CE8422F}"/>
               </a:ext>
             </a:extLst>
           </p:cNvPr>
@@ -11407,7 +13940,7 @@
           <p:cNvPr id="182" name="Straight Connector 181">
             <a:extLst>
               <a:ext uri="{FF2B5EF4-FFF2-40B4-BE49-F238E27FC236}">
-                <a16:creationId xmlns="" xmlns:a16="http://schemas.microsoft.com/office/drawing/2014/main" id="{F031E6ED-00F2-4696-94DE-D5ED7F556E70}"/>
+                <a16:creationId xmlns:a16="http://schemas.microsoft.com/office/drawing/2014/main" xmlns="" id="{F031E6ED-00F2-4696-94DE-D5ED7F556E70}"/>
               </a:ext>
             </a:extLst>
           </p:cNvPr>
@@ -11451,7 +13984,7 @@
           <p:cNvPr id="183" name="Straight Connector 182">
             <a:extLst>
               <a:ext uri="{FF2B5EF4-FFF2-40B4-BE49-F238E27FC236}">
-                <a16:creationId xmlns="" xmlns:a16="http://schemas.microsoft.com/office/drawing/2014/main" id="{9D7873A7-B38E-4E0E-999D-A8D99E1EABD9}"/>
+                <a16:creationId xmlns:a16="http://schemas.microsoft.com/office/drawing/2014/main" xmlns="" id="{9D7873A7-B38E-4E0E-999D-A8D99E1EABD9}"/>
               </a:ext>
             </a:extLst>
           </p:cNvPr>
@@ -11497,7 +14030,7 @@
           <p:cNvPr id="188" name="Straight Connector 187">
             <a:extLst>
               <a:ext uri="{FF2B5EF4-FFF2-40B4-BE49-F238E27FC236}">
-                <a16:creationId xmlns="" xmlns:a16="http://schemas.microsoft.com/office/drawing/2014/main" id="{87A0444B-718A-4A6A-B4B6-BABDFF5C859F}"/>
+                <a16:creationId xmlns:a16="http://schemas.microsoft.com/office/drawing/2014/main" xmlns="" id="{87A0444B-718A-4A6A-B4B6-BABDFF5C859F}"/>
               </a:ext>
             </a:extLst>
           </p:cNvPr>
@@ -11544,7 +14077,7 @@
           <p:cNvPr id="149" name="Straight Connector 148">
             <a:extLst>
               <a:ext uri="{FF2B5EF4-FFF2-40B4-BE49-F238E27FC236}">
-                <a16:creationId xmlns="" xmlns:a16="http://schemas.microsoft.com/office/drawing/2014/main" id="{1E675435-DFF2-4975-9AF8-494706C31341}"/>
+                <a16:creationId xmlns:a16="http://schemas.microsoft.com/office/drawing/2014/main" xmlns="" id="{1E675435-DFF2-4975-9AF8-494706C31341}"/>
               </a:ext>
             </a:extLst>
           </p:cNvPr>
@@ -11590,7 +14123,7 @@
           <p:cNvPr id="196" name="Straight Connector 195">
             <a:extLst>
               <a:ext uri="{FF2B5EF4-FFF2-40B4-BE49-F238E27FC236}">
-                <a16:creationId xmlns="" xmlns:a16="http://schemas.microsoft.com/office/drawing/2014/main" id="{D4062CF4-B13E-47AB-B19E-7830CF679AB4}"/>
+                <a16:creationId xmlns:a16="http://schemas.microsoft.com/office/drawing/2014/main" xmlns="" id="{D4062CF4-B13E-47AB-B19E-7830CF679AB4}"/>
               </a:ext>
             </a:extLst>
           </p:cNvPr>
@@ -11633,7 +14166,7 @@
           <p:cNvPr id="197" name="Straight Connector 196">
             <a:extLst>
               <a:ext uri="{FF2B5EF4-FFF2-40B4-BE49-F238E27FC236}">
-                <a16:creationId xmlns="" xmlns:a16="http://schemas.microsoft.com/office/drawing/2014/main" id="{B5962664-77AB-4C22-B744-FA1D7E777B23}"/>
+                <a16:creationId xmlns:a16="http://schemas.microsoft.com/office/drawing/2014/main" xmlns="" id="{B5962664-77AB-4C22-B744-FA1D7E777B23}"/>
               </a:ext>
             </a:extLst>
           </p:cNvPr>
@@ -11676,7 +14209,7 @@
           <p:cNvPr id="199" name="Straight Connector 198">
             <a:extLst>
               <a:ext uri="{FF2B5EF4-FFF2-40B4-BE49-F238E27FC236}">
-                <a16:creationId xmlns="" xmlns:a16="http://schemas.microsoft.com/office/drawing/2014/main" id="{AFFB58B4-48F0-46C7-BE09-D9B319FC1825}"/>
+                <a16:creationId xmlns:a16="http://schemas.microsoft.com/office/drawing/2014/main" xmlns="" id="{AFFB58B4-48F0-46C7-BE09-D9B319FC1825}"/>
               </a:ext>
             </a:extLst>
           </p:cNvPr>
@@ -11719,7 +14252,7 @@
           <p:cNvPr id="202" name="Straight Connector 201">
             <a:extLst>
               <a:ext uri="{FF2B5EF4-FFF2-40B4-BE49-F238E27FC236}">
-                <a16:creationId xmlns="" xmlns:a16="http://schemas.microsoft.com/office/drawing/2014/main" id="{3EA60244-A450-4F73-8C99-75EF441B25DD}"/>
+                <a16:creationId xmlns:a16="http://schemas.microsoft.com/office/drawing/2014/main" xmlns="" id="{3EA60244-A450-4F73-8C99-75EF441B25DD}"/>
               </a:ext>
             </a:extLst>
           </p:cNvPr>
@@ -11764,7 +14297,7 @@
           <p:cNvPr id="203" name="Straight Connector 202">
             <a:extLst>
               <a:ext uri="{FF2B5EF4-FFF2-40B4-BE49-F238E27FC236}">
-                <a16:creationId xmlns="" xmlns:a16="http://schemas.microsoft.com/office/drawing/2014/main" id="{07DF6C1C-DB45-42C1-B837-959E48418FA5}"/>
+                <a16:creationId xmlns:a16="http://schemas.microsoft.com/office/drawing/2014/main" xmlns="" id="{07DF6C1C-DB45-42C1-B837-959E48418FA5}"/>
               </a:ext>
             </a:extLst>
           </p:cNvPr>
@@ -11807,7 +14340,7 @@
           <p:cNvPr id="204" name="Straight Connector 203">
             <a:extLst>
               <a:ext uri="{FF2B5EF4-FFF2-40B4-BE49-F238E27FC236}">
-                <a16:creationId xmlns="" xmlns:a16="http://schemas.microsoft.com/office/drawing/2014/main" id="{B3E6B8A0-135A-448D-AF10-BBD1B0765586}"/>
+                <a16:creationId xmlns:a16="http://schemas.microsoft.com/office/drawing/2014/main" xmlns="" id="{B3E6B8A0-135A-448D-AF10-BBD1B0765586}"/>
               </a:ext>
             </a:extLst>
           </p:cNvPr>
@@ -11850,7 +14383,7 @@
           <p:cNvPr id="208" name="Straight Connector 207">
             <a:extLst>
               <a:ext uri="{FF2B5EF4-FFF2-40B4-BE49-F238E27FC236}">
-                <a16:creationId xmlns="" xmlns:a16="http://schemas.microsoft.com/office/drawing/2014/main" id="{6D8211AC-B0B0-4C85-9140-CD9F8ADC7C41}"/>
+                <a16:creationId xmlns:a16="http://schemas.microsoft.com/office/drawing/2014/main" xmlns="" id="{6D8211AC-B0B0-4C85-9140-CD9F8ADC7C41}"/>
               </a:ext>
             </a:extLst>
           </p:cNvPr>
@@ -11893,7 +14426,7 @@
           <p:cNvPr id="209" name="Straight Connector 208">
             <a:extLst>
               <a:ext uri="{FF2B5EF4-FFF2-40B4-BE49-F238E27FC236}">
-                <a16:creationId xmlns="" xmlns:a16="http://schemas.microsoft.com/office/drawing/2014/main" id="{E562CE00-8FD2-4C83-81F6-738C4435D9CE}"/>
+                <a16:creationId xmlns:a16="http://schemas.microsoft.com/office/drawing/2014/main" xmlns="" id="{E562CE00-8FD2-4C83-81F6-738C4435D9CE}"/>
               </a:ext>
             </a:extLst>
           </p:cNvPr>
@@ -11938,7 +14471,7 @@
           <p:cNvPr id="84" name="Rectangle 83">
             <a:extLst>
               <a:ext uri="{FF2B5EF4-FFF2-40B4-BE49-F238E27FC236}">
-                <a16:creationId xmlns="" xmlns:a16="http://schemas.microsoft.com/office/drawing/2014/main" id="{17D0B512-BE19-4AE8-9775-2EBAFF8E2DDE}"/>
+                <a16:creationId xmlns:a16="http://schemas.microsoft.com/office/drawing/2014/main" xmlns="" id="{17D0B512-BE19-4AE8-9775-2EBAFF8E2DDE}"/>
               </a:ext>
             </a:extLst>
           </p:cNvPr>
@@ -12004,7 +14537,7 @@
           <p:cNvPr id="85" name="Hexagon 84">
             <a:extLst>
               <a:ext uri="{FF2B5EF4-FFF2-40B4-BE49-F238E27FC236}">
-                <a16:creationId xmlns="" xmlns:a16="http://schemas.microsoft.com/office/drawing/2014/main" id="{C8C9F86A-12F0-4CEC-8AA6-3AC4D725F832}"/>
+                <a16:creationId xmlns:a16="http://schemas.microsoft.com/office/drawing/2014/main" xmlns="" id="{C8C9F86A-12F0-4CEC-8AA6-3AC4D725F832}"/>
               </a:ext>
             </a:extLst>
           </p:cNvPr>
@@ -12065,7 +14598,7 @@
           <p:cNvPr id="88" name="Straight Connector 87">
             <a:extLst>
               <a:ext uri="{FF2B5EF4-FFF2-40B4-BE49-F238E27FC236}">
-                <a16:creationId xmlns="" xmlns:a16="http://schemas.microsoft.com/office/drawing/2014/main" id="{95C71DCE-71A4-41ED-B2FF-A66F10A55032}"/>
+                <a16:creationId xmlns:a16="http://schemas.microsoft.com/office/drawing/2014/main" xmlns="" id="{95C71DCE-71A4-41ED-B2FF-A66F10A55032}"/>
               </a:ext>
             </a:extLst>
           </p:cNvPr>
@@ -12110,7 +14643,7 @@
           <p:cNvPr id="90" name="Rectangle 89">
             <a:extLst>
               <a:ext uri="{FF2B5EF4-FFF2-40B4-BE49-F238E27FC236}">
-                <a16:creationId xmlns="" xmlns:a16="http://schemas.microsoft.com/office/drawing/2014/main" id="{DD87AC21-5DA3-4AEF-ABA8-95F38D872B33}"/>
+                <a16:creationId xmlns:a16="http://schemas.microsoft.com/office/drawing/2014/main" xmlns="" id="{DD87AC21-5DA3-4AEF-ABA8-95F38D872B33}"/>
               </a:ext>
             </a:extLst>
           </p:cNvPr>
@@ -12171,7 +14704,7 @@
           <p:cNvPr id="91" name="Rectangle 90">
             <a:extLst>
               <a:ext uri="{FF2B5EF4-FFF2-40B4-BE49-F238E27FC236}">
-                <a16:creationId xmlns="" xmlns:a16="http://schemas.microsoft.com/office/drawing/2014/main" id="{E80762C3-4C3C-4E21-A485-024069189359}"/>
+                <a16:creationId xmlns:a16="http://schemas.microsoft.com/office/drawing/2014/main" xmlns="" id="{E80762C3-4C3C-4E21-A485-024069189359}"/>
               </a:ext>
             </a:extLst>
           </p:cNvPr>
@@ -12232,7 +14765,7 @@
           <p:cNvPr id="92" name="Straight Connector 91">
             <a:extLst>
               <a:ext uri="{FF2B5EF4-FFF2-40B4-BE49-F238E27FC236}">
-                <a16:creationId xmlns="" xmlns:a16="http://schemas.microsoft.com/office/drawing/2014/main" id="{315C90F1-6EAA-47CE-B6C0-E128397FACED}"/>
+                <a16:creationId xmlns:a16="http://schemas.microsoft.com/office/drawing/2014/main" xmlns="" id="{315C90F1-6EAA-47CE-B6C0-E128397FACED}"/>
               </a:ext>
             </a:extLst>
           </p:cNvPr>
@@ -12278,7 +14811,7 @@
           <p:cNvPr id="94" name="Straight Connector 93">
             <a:extLst>
               <a:ext uri="{FF2B5EF4-FFF2-40B4-BE49-F238E27FC236}">
-                <a16:creationId xmlns="" xmlns:a16="http://schemas.microsoft.com/office/drawing/2014/main" id="{74522AEA-6241-4747-8B3D-39D951117EFF}"/>
+                <a16:creationId xmlns:a16="http://schemas.microsoft.com/office/drawing/2014/main" xmlns="" id="{74522AEA-6241-4747-8B3D-39D951117EFF}"/>
               </a:ext>
             </a:extLst>
           </p:cNvPr>
@@ -12324,7 +14857,7 @@
           <p:cNvPr id="95" name="Straight Connector 94">
             <a:extLst>
               <a:ext uri="{FF2B5EF4-FFF2-40B4-BE49-F238E27FC236}">
-                <a16:creationId xmlns="" xmlns:a16="http://schemas.microsoft.com/office/drawing/2014/main" id="{5177E94F-811E-4461-9A0E-1573EB66B3C5}"/>
+                <a16:creationId xmlns:a16="http://schemas.microsoft.com/office/drawing/2014/main" xmlns="" id="{5177E94F-811E-4461-9A0E-1573EB66B3C5}"/>
               </a:ext>
             </a:extLst>
           </p:cNvPr>
@@ -12367,7 +14900,7 @@
           <p:cNvPr id="97" name="Straight Connector 96">
             <a:extLst>
               <a:ext uri="{FF2B5EF4-FFF2-40B4-BE49-F238E27FC236}">
-                <a16:creationId xmlns="" xmlns:a16="http://schemas.microsoft.com/office/drawing/2014/main" id="{4DEF5E21-FD4E-4B9D-98E2-2FD2B27A33CB}"/>
+                <a16:creationId xmlns:a16="http://schemas.microsoft.com/office/drawing/2014/main" xmlns="" id="{4DEF5E21-FD4E-4B9D-98E2-2FD2B27A33CB}"/>
               </a:ext>
             </a:extLst>
           </p:cNvPr>
@@ -12413,7 +14946,7 @@
           <p:cNvPr id="99" name="Straight Connector 98">
             <a:extLst>
               <a:ext uri="{FF2B5EF4-FFF2-40B4-BE49-F238E27FC236}">
-                <a16:creationId xmlns="" xmlns:a16="http://schemas.microsoft.com/office/drawing/2014/main" id="{9AB27C35-2ABF-4328-9F64-B67363E1F223}"/>
+                <a16:creationId xmlns:a16="http://schemas.microsoft.com/office/drawing/2014/main" xmlns="" id="{9AB27C35-2ABF-4328-9F64-B67363E1F223}"/>
               </a:ext>
             </a:extLst>
           </p:cNvPr>
@@ -12459,7 +14992,7 @@
           <p:cNvPr id="101" name="Straight Connector 100">
             <a:extLst>
               <a:ext uri="{FF2B5EF4-FFF2-40B4-BE49-F238E27FC236}">
-                <a16:creationId xmlns="" xmlns:a16="http://schemas.microsoft.com/office/drawing/2014/main" id="{44DB9393-CA63-47ED-9AF1-F5D9E8F20F0F}"/>
+                <a16:creationId xmlns:a16="http://schemas.microsoft.com/office/drawing/2014/main" xmlns="" id="{44DB9393-CA63-47ED-9AF1-F5D9E8F20F0F}"/>
               </a:ext>
             </a:extLst>
           </p:cNvPr>
@@ -12504,7 +15037,7 @@
           <p:cNvPr id="103" name="Straight Connector 102">
             <a:extLst>
               <a:ext uri="{FF2B5EF4-FFF2-40B4-BE49-F238E27FC236}">
-                <a16:creationId xmlns="" xmlns:a16="http://schemas.microsoft.com/office/drawing/2014/main" id="{347EC7EE-A764-4FE3-B426-1AAF28120AC9}"/>
+                <a16:creationId xmlns:a16="http://schemas.microsoft.com/office/drawing/2014/main" xmlns="" id="{347EC7EE-A764-4FE3-B426-1AAF28120AC9}"/>
               </a:ext>
             </a:extLst>
           </p:cNvPr>
@@ -12547,7 +15080,7 @@
           <p:cNvPr id="104" name="Straight Connector 103">
             <a:extLst>
               <a:ext uri="{FF2B5EF4-FFF2-40B4-BE49-F238E27FC236}">
-                <a16:creationId xmlns="" xmlns:a16="http://schemas.microsoft.com/office/drawing/2014/main" id="{EC72FD57-05F9-4F5A-AE74-38E9E90F8AF9}"/>
+                <a16:creationId xmlns:a16="http://schemas.microsoft.com/office/drawing/2014/main" xmlns="" id="{EC72FD57-05F9-4F5A-AE74-38E9E90F8AF9}"/>
               </a:ext>
             </a:extLst>
           </p:cNvPr>
@@ -12590,7 +15123,7 @@
           <p:cNvPr id="105" name="Straight Connector 104">
             <a:extLst>
               <a:ext uri="{FF2B5EF4-FFF2-40B4-BE49-F238E27FC236}">
-                <a16:creationId xmlns="" xmlns:a16="http://schemas.microsoft.com/office/drawing/2014/main" id="{97D1C821-72D4-41FC-90A8-81373AAF4798}"/>
+                <a16:creationId xmlns:a16="http://schemas.microsoft.com/office/drawing/2014/main" xmlns="" id="{97D1C821-72D4-41FC-90A8-81373AAF4798}"/>
               </a:ext>
             </a:extLst>
           </p:cNvPr>
@@ -12635,7 +15168,7 @@
           <p:cNvPr id="107" name="Straight Connector 106">
             <a:extLst>
               <a:ext uri="{FF2B5EF4-FFF2-40B4-BE49-F238E27FC236}">
-                <a16:creationId xmlns="" xmlns:a16="http://schemas.microsoft.com/office/drawing/2014/main" id="{7DF74E95-D999-479D-AAE0-728D68869375}"/>
+                <a16:creationId xmlns:a16="http://schemas.microsoft.com/office/drawing/2014/main" xmlns="" id="{7DF74E95-D999-479D-AAE0-728D68869375}"/>
               </a:ext>
             </a:extLst>
           </p:cNvPr>
@@ -12678,7 +15211,7 @@
           <p:cNvPr id="108" name="Straight Connector 107">
             <a:extLst>
               <a:ext uri="{FF2B5EF4-FFF2-40B4-BE49-F238E27FC236}">
-                <a16:creationId xmlns="" xmlns:a16="http://schemas.microsoft.com/office/drawing/2014/main" id="{4ECE29B2-DA7B-4584-9707-3E02CB579E44}"/>
+                <a16:creationId xmlns:a16="http://schemas.microsoft.com/office/drawing/2014/main" xmlns="" id="{4ECE29B2-DA7B-4584-9707-3E02CB579E44}"/>
               </a:ext>
             </a:extLst>
           </p:cNvPr>
@@ -12721,7 +15254,7 @@
           <p:cNvPr id="110" name="Rectangle 109">
             <a:extLst>
               <a:ext uri="{FF2B5EF4-FFF2-40B4-BE49-F238E27FC236}">
-                <a16:creationId xmlns="" xmlns:a16="http://schemas.microsoft.com/office/drawing/2014/main" id="{3BD2962A-3257-4E6E-9BEE-4FD083EB94D0}"/>
+                <a16:creationId xmlns:a16="http://schemas.microsoft.com/office/drawing/2014/main" xmlns="" id="{3BD2962A-3257-4E6E-9BEE-4FD083EB94D0}"/>
               </a:ext>
             </a:extLst>
           </p:cNvPr>
@@ -12782,7 +15315,7 @@
           <p:cNvPr id="113" name="Straight Connector 112">
             <a:extLst>
               <a:ext uri="{FF2B5EF4-FFF2-40B4-BE49-F238E27FC236}">
-                <a16:creationId xmlns="" xmlns:a16="http://schemas.microsoft.com/office/drawing/2014/main" id="{7ED55529-0951-4630-A204-6CE339CF6F11}"/>
+                <a16:creationId xmlns:a16="http://schemas.microsoft.com/office/drawing/2014/main" xmlns="" id="{7ED55529-0951-4630-A204-6CE339CF6F11}"/>
               </a:ext>
             </a:extLst>
           </p:cNvPr>
@@ -12825,7 +15358,7 @@
           <p:cNvPr id="114" name="Straight Connector 113">
             <a:extLst>
               <a:ext uri="{FF2B5EF4-FFF2-40B4-BE49-F238E27FC236}">
-                <a16:creationId xmlns="" xmlns:a16="http://schemas.microsoft.com/office/drawing/2014/main" id="{B18ABCC6-E55F-4F10-A399-7A877383D2EA}"/>
+                <a16:creationId xmlns:a16="http://schemas.microsoft.com/office/drawing/2014/main" xmlns="" id="{B18ABCC6-E55F-4F10-A399-7A877383D2EA}"/>
               </a:ext>
             </a:extLst>
           </p:cNvPr>
@@ -12868,7 +15401,7 @@
           <p:cNvPr id="115" name="Straight Connector 114">
             <a:extLst>
               <a:ext uri="{FF2B5EF4-FFF2-40B4-BE49-F238E27FC236}">
-                <a16:creationId xmlns="" xmlns:a16="http://schemas.microsoft.com/office/drawing/2014/main" id="{E098305D-4515-46DB-A3B3-388532491AC1}"/>
+                <a16:creationId xmlns:a16="http://schemas.microsoft.com/office/drawing/2014/main" xmlns="" id="{E098305D-4515-46DB-A3B3-388532491AC1}"/>
               </a:ext>
             </a:extLst>
           </p:cNvPr>
@@ -12911,7 +15444,7 @@
           <p:cNvPr id="116" name="Rectangle 115">
             <a:extLst>
               <a:ext uri="{FF2B5EF4-FFF2-40B4-BE49-F238E27FC236}">
-                <a16:creationId xmlns="" xmlns:a16="http://schemas.microsoft.com/office/drawing/2014/main" id="{435EB641-D2D2-4ABC-8D54-22786D7AE299}"/>
+                <a16:creationId xmlns:a16="http://schemas.microsoft.com/office/drawing/2014/main" xmlns="" id="{435EB641-D2D2-4ABC-8D54-22786D7AE299}"/>
               </a:ext>
             </a:extLst>
           </p:cNvPr>
@@ -12972,7 +15505,7 @@
           <p:cNvPr id="118" name="Straight Connector 117">
             <a:extLst>
               <a:ext uri="{FF2B5EF4-FFF2-40B4-BE49-F238E27FC236}">
-                <a16:creationId xmlns="" xmlns:a16="http://schemas.microsoft.com/office/drawing/2014/main" id="{567B9E37-51C2-4220-ABCF-5E0D4B9D4343}"/>
+                <a16:creationId xmlns:a16="http://schemas.microsoft.com/office/drawing/2014/main" xmlns="" id="{567B9E37-51C2-4220-ABCF-5E0D4B9D4343}"/>
               </a:ext>
             </a:extLst>
           </p:cNvPr>
@@ -13015,7 +15548,7 @@
           <p:cNvPr id="119" name="Straight Connector 118">
             <a:extLst>
               <a:ext uri="{FF2B5EF4-FFF2-40B4-BE49-F238E27FC236}">
-                <a16:creationId xmlns="" xmlns:a16="http://schemas.microsoft.com/office/drawing/2014/main" id="{B98C24B2-E161-4BA7-A2D3-AC33AA4FA1B6}"/>
+                <a16:creationId xmlns:a16="http://schemas.microsoft.com/office/drawing/2014/main" xmlns="" id="{B98C24B2-E161-4BA7-A2D3-AC33AA4FA1B6}"/>
               </a:ext>
             </a:extLst>
           </p:cNvPr>
@@ -13058,7 +15591,7 @@
           <p:cNvPr id="121" name="Straight Connector 120">
             <a:extLst>
               <a:ext uri="{FF2B5EF4-FFF2-40B4-BE49-F238E27FC236}">
-                <a16:creationId xmlns="" xmlns:a16="http://schemas.microsoft.com/office/drawing/2014/main" id="{A4DE73E7-C223-4783-A0B6-C04A9A38FDCB}"/>
+                <a16:creationId xmlns:a16="http://schemas.microsoft.com/office/drawing/2014/main" xmlns="" id="{A4DE73E7-C223-4783-A0B6-C04A9A38FDCB}"/>
               </a:ext>
             </a:extLst>
           </p:cNvPr>
@@ -13101,7 +15634,7 @@
           <p:cNvPr id="124" name="Straight Connector 123">
             <a:extLst>
               <a:ext uri="{FF2B5EF4-FFF2-40B4-BE49-F238E27FC236}">
-                <a16:creationId xmlns="" xmlns:a16="http://schemas.microsoft.com/office/drawing/2014/main" id="{0F379A07-C853-4542-9B14-B79B65B8CA52}"/>
+                <a16:creationId xmlns:a16="http://schemas.microsoft.com/office/drawing/2014/main" xmlns="" id="{0F379A07-C853-4542-9B14-B79B65B8CA52}"/>
               </a:ext>
             </a:extLst>
           </p:cNvPr>
@@ -13144,7 +15677,7 @@
           <p:cNvPr id="130" name="Rectangle 129">
             <a:extLst>
               <a:ext uri="{FF2B5EF4-FFF2-40B4-BE49-F238E27FC236}">
-                <a16:creationId xmlns="" xmlns:a16="http://schemas.microsoft.com/office/drawing/2014/main" id="{AE200014-E3DA-4FB6-8AE9-7AC69FADA457}"/>
+                <a16:creationId xmlns:a16="http://schemas.microsoft.com/office/drawing/2014/main" xmlns="" id="{AE200014-E3DA-4FB6-8AE9-7AC69FADA457}"/>
               </a:ext>
             </a:extLst>
           </p:cNvPr>
@@ -13303,7 +15836,7 @@
           <p:cNvPr id="131" name="Left-Right Arrow 28">
             <a:extLst>
               <a:ext uri="{FF2B5EF4-FFF2-40B4-BE49-F238E27FC236}">
-                <a16:creationId xmlns="" xmlns:a16="http://schemas.microsoft.com/office/drawing/2014/main" id="{8615E9E8-9D40-47C3-9F24-A9BCF797DE95}"/>
+                <a16:creationId xmlns:a16="http://schemas.microsoft.com/office/drawing/2014/main" xmlns="" id="{8615E9E8-9D40-47C3-9F24-A9BCF797DE95}"/>
               </a:ext>
             </a:extLst>
           </p:cNvPr>
@@ -13452,7 +15985,7 @@
           <p:cNvPr id="134" name="Isosceles Triangle 133">
             <a:extLst>
               <a:ext uri="{FF2B5EF4-FFF2-40B4-BE49-F238E27FC236}">
-                <a16:creationId xmlns="" xmlns:a16="http://schemas.microsoft.com/office/drawing/2014/main" id="{E4A4DDDD-7D7A-4694-A109-88B16E5474BE}"/>
+                <a16:creationId xmlns:a16="http://schemas.microsoft.com/office/drawing/2014/main" xmlns="" id="{E4A4DDDD-7D7A-4694-A109-88B16E5474BE}"/>
               </a:ext>
             </a:extLst>
           </p:cNvPr>
@@ -13595,7 +16128,7 @@
           <p:cNvPr id="136" name="Rectangle 135">
             <a:extLst>
               <a:ext uri="{FF2B5EF4-FFF2-40B4-BE49-F238E27FC236}">
-                <a16:creationId xmlns="" xmlns:a16="http://schemas.microsoft.com/office/drawing/2014/main" id="{E3807C0B-0FB4-4284-AD06-2830DB8E77E7}"/>
+                <a16:creationId xmlns:a16="http://schemas.microsoft.com/office/drawing/2014/main" xmlns="" id="{E3807C0B-0FB4-4284-AD06-2830DB8E77E7}"/>
               </a:ext>
             </a:extLst>
           </p:cNvPr>
@@ -13754,7 +16287,7 @@
           <p:cNvPr id="138" name="Isosceles Triangle 137">
             <a:extLst>
               <a:ext uri="{FF2B5EF4-FFF2-40B4-BE49-F238E27FC236}">
-                <a16:creationId xmlns="" xmlns:a16="http://schemas.microsoft.com/office/drawing/2014/main" id="{17CDB652-A940-4CA1-B3BD-DD4B752470ED}"/>
+                <a16:creationId xmlns:a16="http://schemas.microsoft.com/office/drawing/2014/main" xmlns="" id="{17CDB652-A940-4CA1-B3BD-DD4B752470ED}"/>
               </a:ext>
             </a:extLst>
           </p:cNvPr>
@@ -13895,7 +16428,7 @@
           <p:cNvPr id="141" name="Left-Right Arrow 46">
             <a:extLst>
               <a:ext uri="{FF2B5EF4-FFF2-40B4-BE49-F238E27FC236}">
-                <a16:creationId xmlns="" xmlns:a16="http://schemas.microsoft.com/office/drawing/2014/main" id="{3850E0F9-5B9C-485D-95FF-3602CB1BBDD7}"/>
+                <a16:creationId xmlns:a16="http://schemas.microsoft.com/office/drawing/2014/main" xmlns="" id="{3850E0F9-5B9C-485D-95FF-3602CB1BBDD7}"/>
               </a:ext>
             </a:extLst>
           </p:cNvPr>
@@ -14042,7 +16575,7 @@
           <p:cNvPr id="142" name="Rectangle 141">
             <a:extLst>
               <a:ext uri="{FF2B5EF4-FFF2-40B4-BE49-F238E27FC236}">
-                <a16:creationId xmlns="" xmlns:a16="http://schemas.microsoft.com/office/drawing/2014/main" id="{73407487-E5DD-4C4C-A7F4-E67393CAFD5B}"/>
+                <a16:creationId xmlns:a16="http://schemas.microsoft.com/office/drawing/2014/main" xmlns="" id="{73407487-E5DD-4C4C-A7F4-E67393CAFD5B}"/>
               </a:ext>
             </a:extLst>
           </p:cNvPr>
@@ -14189,7 +16722,7 @@
           <p:cNvPr id="143" name="Rectangle 142">
             <a:extLst>
               <a:ext uri="{FF2B5EF4-FFF2-40B4-BE49-F238E27FC236}">
-                <a16:creationId xmlns="" xmlns:a16="http://schemas.microsoft.com/office/drawing/2014/main" id="{705EAEDA-29D0-49A6-A7F0-D04D08F7FDCA}"/>
+                <a16:creationId xmlns:a16="http://schemas.microsoft.com/office/drawing/2014/main" xmlns="" id="{705EAEDA-29D0-49A6-A7F0-D04D08F7FDCA}"/>
               </a:ext>
             </a:extLst>
           </p:cNvPr>
@@ -14336,7 +16869,7 @@
           <p:cNvPr id="144" name="TextBox 143">
             <a:extLst>
               <a:ext uri="{FF2B5EF4-FFF2-40B4-BE49-F238E27FC236}">
-                <a16:creationId xmlns="" xmlns:a16="http://schemas.microsoft.com/office/drawing/2014/main" id="{484FF4BB-48CF-4D99-9DAA-BF0DB42A7A44}"/>
+                <a16:creationId xmlns:a16="http://schemas.microsoft.com/office/drawing/2014/main" xmlns="" id="{484FF4BB-48CF-4D99-9DAA-BF0DB42A7A44}"/>
               </a:ext>
             </a:extLst>
           </p:cNvPr>
@@ -14398,7 +16931,7 @@
           <p:cNvPr id="150" name="Oval 149">
             <a:extLst>
               <a:ext uri="{FF2B5EF4-FFF2-40B4-BE49-F238E27FC236}">
-                <a16:creationId xmlns="" xmlns:a16="http://schemas.microsoft.com/office/drawing/2014/main" id="{11591D0B-04CC-4449-9F5F-472DA01CF5FA}"/>
+                <a16:creationId xmlns:a16="http://schemas.microsoft.com/office/drawing/2014/main" xmlns="" id="{11591D0B-04CC-4449-9F5F-472DA01CF5FA}"/>
               </a:ext>
             </a:extLst>
           </p:cNvPr>
@@ -14454,7 +16987,7 @@
           <p:cNvPr id="152" name="Rectangle 151">
             <a:extLst>
               <a:ext uri="{FF2B5EF4-FFF2-40B4-BE49-F238E27FC236}">
-                <a16:creationId xmlns="" xmlns:a16="http://schemas.microsoft.com/office/drawing/2014/main" id="{444CD638-30FD-4085-A556-A0440A7D5F6F}"/>
+                <a16:creationId xmlns:a16="http://schemas.microsoft.com/office/drawing/2014/main" xmlns="" id="{444CD638-30FD-4085-A556-A0440A7D5F6F}"/>
               </a:ext>
             </a:extLst>
           </p:cNvPr>
@@ -14520,7 +17053,7 @@
           <p:cNvPr id="156" name="Rectangle 155">
             <a:extLst>
               <a:ext uri="{FF2B5EF4-FFF2-40B4-BE49-F238E27FC236}">
-                <a16:creationId xmlns="" xmlns:a16="http://schemas.microsoft.com/office/drawing/2014/main" id="{23C9A19F-5BF1-4625-9315-0A33B1BD7A88}"/>
+                <a16:creationId xmlns:a16="http://schemas.microsoft.com/office/drawing/2014/main" xmlns="" id="{23C9A19F-5BF1-4625-9315-0A33B1BD7A88}"/>
               </a:ext>
             </a:extLst>
           </p:cNvPr>
@@ -14667,7 +17200,7 @@
           <p:cNvPr id="123" name="Rectangle 122">
             <a:extLst>
               <a:ext uri="{FF2B5EF4-FFF2-40B4-BE49-F238E27FC236}">
-                <a16:creationId xmlns="" xmlns:a16="http://schemas.microsoft.com/office/drawing/2014/main" id="{F3D6E759-8AC8-48DC-B07E-ED5F2D591F4C}"/>
+                <a16:creationId xmlns:a16="http://schemas.microsoft.com/office/drawing/2014/main" xmlns="" id="{F3D6E759-8AC8-48DC-B07E-ED5F2D591F4C}"/>
               </a:ext>
             </a:extLst>
           </p:cNvPr>
@@ -14728,7 +17261,7 @@
           <p:cNvPr id="157" name="TextBox 156">
             <a:extLst>
               <a:ext uri="{FF2B5EF4-FFF2-40B4-BE49-F238E27FC236}">
-                <a16:creationId xmlns="" xmlns:a16="http://schemas.microsoft.com/office/drawing/2014/main" id="{12E8A6ED-5A44-499A-AA10-AB80B201A1EB}"/>
+                <a16:creationId xmlns:a16="http://schemas.microsoft.com/office/drawing/2014/main" xmlns="" id="{12E8A6ED-5A44-499A-AA10-AB80B201A1EB}"/>
               </a:ext>
             </a:extLst>
           </p:cNvPr>
@@ -14768,7 +17301,7 @@
           <p:cNvPr id="159" name="Left-Right Arrow 28">
             <a:extLst>
               <a:ext uri="{FF2B5EF4-FFF2-40B4-BE49-F238E27FC236}">
-                <a16:creationId xmlns="" xmlns:a16="http://schemas.microsoft.com/office/drawing/2014/main" id="{4448905D-B6A1-4D9A-9BCE-10EBE464E2D1}"/>
+                <a16:creationId xmlns:a16="http://schemas.microsoft.com/office/drawing/2014/main" xmlns="" id="{4448905D-B6A1-4D9A-9BCE-10EBE464E2D1}"/>
               </a:ext>
             </a:extLst>
           </p:cNvPr>
@@ -14920,7 +17453,7 @@
           <p:cNvPr id="163" name="Left-Right Arrow 28">
             <a:extLst>
               <a:ext uri="{FF2B5EF4-FFF2-40B4-BE49-F238E27FC236}">
-                <a16:creationId xmlns="" xmlns:a16="http://schemas.microsoft.com/office/drawing/2014/main" id="{7A662A17-E3B0-48D8-B371-CEC08352A465}"/>
+                <a16:creationId xmlns:a16="http://schemas.microsoft.com/office/drawing/2014/main" xmlns="" id="{7A662A17-E3B0-48D8-B371-CEC08352A465}"/>
               </a:ext>
             </a:extLst>
           </p:cNvPr>
@@ -15072,7 +17605,7 @@
           <p:cNvPr id="167" name="Rectangle 166">
             <a:extLst>
               <a:ext uri="{FF2B5EF4-FFF2-40B4-BE49-F238E27FC236}">
-                <a16:creationId xmlns="" xmlns:a16="http://schemas.microsoft.com/office/drawing/2014/main" id="{25FB184D-FEFC-49F9-863E-27F9461C273D}"/>
+                <a16:creationId xmlns:a16="http://schemas.microsoft.com/office/drawing/2014/main" xmlns="" id="{25FB184D-FEFC-49F9-863E-27F9461C273D}"/>
               </a:ext>
             </a:extLst>
           </p:cNvPr>
@@ -15125,7 +17658,7 @@
           <p:cNvPr id="168" name="Straight Connector 167">
             <a:extLst>
               <a:ext uri="{FF2B5EF4-FFF2-40B4-BE49-F238E27FC236}">
-                <a16:creationId xmlns="" xmlns:a16="http://schemas.microsoft.com/office/drawing/2014/main" id="{54D64CCA-3942-410D-A94E-02D8989AC6A6}"/>
+                <a16:creationId xmlns:a16="http://schemas.microsoft.com/office/drawing/2014/main" xmlns="" id="{54D64CCA-3942-410D-A94E-02D8989AC6A6}"/>
               </a:ext>
             </a:extLst>
           </p:cNvPr>
@@ -15171,7 +17704,7 @@
           <p:cNvPr id="169" name="Straight Connector 168">
             <a:extLst>
               <a:ext uri="{FF2B5EF4-FFF2-40B4-BE49-F238E27FC236}">
-                <a16:creationId xmlns="" xmlns:a16="http://schemas.microsoft.com/office/drawing/2014/main" id="{22528785-C3BF-4C25-ABAE-A6D0B0A3BD8E}"/>
+                <a16:creationId xmlns:a16="http://schemas.microsoft.com/office/drawing/2014/main" xmlns="" id="{22528785-C3BF-4C25-ABAE-A6D0B0A3BD8E}"/>
               </a:ext>
             </a:extLst>
           </p:cNvPr>
@@ -15218,7 +17751,7 @@
           <p:cNvPr id="170" name="Oval 169">
             <a:extLst>
               <a:ext uri="{FF2B5EF4-FFF2-40B4-BE49-F238E27FC236}">
-                <a16:creationId xmlns="" xmlns:a16="http://schemas.microsoft.com/office/drawing/2014/main" id="{6B1B755B-C141-4699-B4B0-D17C73AF9C5E}"/>
+                <a16:creationId xmlns:a16="http://schemas.microsoft.com/office/drawing/2014/main" xmlns="" id="{6B1B755B-C141-4699-B4B0-D17C73AF9C5E}"/>
               </a:ext>
             </a:extLst>
           </p:cNvPr>
@@ -15274,7 +17807,7 @@
           <p:cNvPr id="151" name="Rectangle 150">
             <a:extLst>
               <a:ext uri="{FF2B5EF4-FFF2-40B4-BE49-F238E27FC236}">
-                <a16:creationId xmlns="" xmlns:a16="http://schemas.microsoft.com/office/drawing/2014/main" id="{6C3C2EFE-C3BE-43C8-A167-7224D587B57F}"/>
+                <a16:creationId xmlns:a16="http://schemas.microsoft.com/office/drawing/2014/main" xmlns="" id="{6C3C2EFE-C3BE-43C8-A167-7224D587B57F}"/>
               </a:ext>
             </a:extLst>
           </p:cNvPr>
@@ -15424,7 +17957,7 @@
           <p:cNvPr id="153" name="Rectangle 152">
             <a:extLst>
               <a:ext uri="{FF2B5EF4-FFF2-40B4-BE49-F238E27FC236}">
-                <a16:creationId xmlns="" xmlns:a16="http://schemas.microsoft.com/office/drawing/2014/main" id="{E6A95029-A6FA-4422-99DA-D4B7AA501C3B}"/>
+                <a16:creationId xmlns:a16="http://schemas.microsoft.com/office/drawing/2014/main" xmlns="" id="{E6A95029-A6FA-4422-99DA-D4B7AA501C3B}"/>
               </a:ext>
             </a:extLst>
           </p:cNvPr>
@@ -15513,7 +18046,7 @@
           <p:cNvPr id="164" name="Rectangle 163">
             <a:extLst>
               <a:ext uri="{FF2B5EF4-FFF2-40B4-BE49-F238E27FC236}">
-                <a16:creationId xmlns="" xmlns:a16="http://schemas.microsoft.com/office/drawing/2014/main" id="{2EBE1555-2F7D-4A6E-972F-BD9FA8DE3162}"/>
+                <a16:creationId xmlns:a16="http://schemas.microsoft.com/office/drawing/2014/main" xmlns="" id="{2EBE1555-2F7D-4A6E-972F-BD9FA8DE3162}"/>
               </a:ext>
             </a:extLst>
           </p:cNvPr>
@@ -15590,7 +18123,7 @@
           <p:cNvPr id="165" name="Rectangle 164">
             <a:extLst>
               <a:ext uri="{FF2B5EF4-FFF2-40B4-BE49-F238E27FC236}">
-                <a16:creationId xmlns="" xmlns:a16="http://schemas.microsoft.com/office/drawing/2014/main" id="{325C9956-46DE-4A46-8BC6-28FA0482E336}"/>
+                <a16:creationId xmlns:a16="http://schemas.microsoft.com/office/drawing/2014/main" xmlns="" id="{325C9956-46DE-4A46-8BC6-28FA0482E336}"/>
               </a:ext>
             </a:extLst>
           </p:cNvPr>
@@ -15667,7 +18200,7 @@
           <p:cNvPr id="166" name="Arrow: Left-Right 165">
             <a:extLst>
               <a:ext uri="{FF2B5EF4-FFF2-40B4-BE49-F238E27FC236}">
-                <a16:creationId xmlns="" xmlns:a16="http://schemas.microsoft.com/office/drawing/2014/main" id="{C45883CD-CAF6-4B02-AD13-CE633BF16DD4}"/>
+                <a16:creationId xmlns:a16="http://schemas.microsoft.com/office/drawing/2014/main" xmlns="" id="{C45883CD-CAF6-4B02-AD13-CE633BF16DD4}"/>
               </a:ext>
             </a:extLst>
           </p:cNvPr>
@@ -15721,7 +18254,7 @@
           <p:cNvPr id="171" name="Arrow: Left-Right 170">
             <a:extLst>
               <a:ext uri="{FF2B5EF4-FFF2-40B4-BE49-F238E27FC236}">
-                <a16:creationId xmlns="" xmlns:a16="http://schemas.microsoft.com/office/drawing/2014/main" id="{05423DF8-A369-4D4C-A736-A6BE6825E742}"/>
+                <a16:creationId xmlns:a16="http://schemas.microsoft.com/office/drawing/2014/main" xmlns="" id="{05423DF8-A369-4D4C-A736-A6BE6825E742}"/>
               </a:ext>
             </a:extLst>
           </p:cNvPr>
@@ -15775,7 +18308,7 @@
           <p:cNvPr id="172" name="Rectangle 171">
             <a:extLst>
               <a:ext uri="{FF2B5EF4-FFF2-40B4-BE49-F238E27FC236}">
-                <a16:creationId xmlns="" xmlns:a16="http://schemas.microsoft.com/office/drawing/2014/main" id="{5EBE168D-0E6A-448D-AF96-3BE0B5983C55}"/>
+                <a16:creationId xmlns:a16="http://schemas.microsoft.com/office/drawing/2014/main" xmlns="" id="{5EBE168D-0E6A-448D-AF96-3BE0B5983C55}"/>
               </a:ext>
             </a:extLst>
           </p:cNvPr>
@@ -15922,7 +18455,7 @@
           <p:cNvPr id="173" name="TextBox 172">
             <a:extLst>
               <a:ext uri="{FF2B5EF4-FFF2-40B4-BE49-F238E27FC236}">
-                <a16:creationId xmlns="" xmlns:a16="http://schemas.microsoft.com/office/drawing/2014/main" id="{56CB5F8C-5E7A-47A4-9625-DD912E331E8A}"/>
+                <a16:creationId xmlns:a16="http://schemas.microsoft.com/office/drawing/2014/main" xmlns="" id="{56CB5F8C-5E7A-47A4-9625-DD912E331E8A}"/>
               </a:ext>
             </a:extLst>
           </p:cNvPr>
@@ -15962,7 +18495,7 @@
           <p:cNvPr id="178" name="Rectangle 177">
             <a:extLst>
               <a:ext uri="{FF2B5EF4-FFF2-40B4-BE49-F238E27FC236}">
-                <a16:creationId xmlns="" xmlns:a16="http://schemas.microsoft.com/office/drawing/2014/main" id="{A35E9947-0CD2-45F3-951C-DB2D4D549EA2}"/>
+                <a16:creationId xmlns:a16="http://schemas.microsoft.com/office/drawing/2014/main" xmlns="" id="{A35E9947-0CD2-45F3-951C-DB2D4D549EA2}"/>
               </a:ext>
             </a:extLst>
           </p:cNvPr>
@@ -16109,7 +18642,7 @@
           <p:cNvPr id="8" name="TextBox 7">
             <a:extLst>
               <a:ext uri="{FF2B5EF4-FFF2-40B4-BE49-F238E27FC236}">
-                <a16:creationId xmlns="" xmlns:a16="http://schemas.microsoft.com/office/drawing/2014/main" id="{CF760423-E486-48A2-AE4A-8CA0DF792890}"/>
+                <a16:creationId xmlns:a16="http://schemas.microsoft.com/office/drawing/2014/main" xmlns="" id="{CF760423-E486-48A2-AE4A-8CA0DF792890}"/>
               </a:ext>
             </a:extLst>
           </p:cNvPr>
@@ -16149,7 +18682,7 @@
           <p:cNvPr id="180" name="Rectangle 179">
             <a:extLst>
               <a:ext uri="{FF2B5EF4-FFF2-40B4-BE49-F238E27FC236}">
-                <a16:creationId xmlns="" xmlns:a16="http://schemas.microsoft.com/office/drawing/2014/main" id="{4EEEE569-C0C5-4B34-912B-C46CBAF318FD}"/>
+                <a16:creationId xmlns:a16="http://schemas.microsoft.com/office/drawing/2014/main" xmlns="" id="{4EEEE569-C0C5-4B34-912B-C46CBAF318FD}"/>
               </a:ext>
             </a:extLst>
           </p:cNvPr>
@@ -16296,7 +18829,7 @@
           <p:cNvPr id="184" name="Left-Right Arrow 63">
             <a:extLst>
               <a:ext uri="{FF2B5EF4-FFF2-40B4-BE49-F238E27FC236}">
-                <a16:creationId xmlns="" xmlns:a16="http://schemas.microsoft.com/office/drawing/2014/main" id="{83B32353-9324-4130-8893-50EE2E09D4AE}"/>
+                <a16:creationId xmlns:a16="http://schemas.microsoft.com/office/drawing/2014/main" xmlns="" id="{83B32353-9324-4130-8893-50EE2E09D4AE}"/>
               </a:ext>
             </a:extLst>
           </p:cNvPr>
@@ -16443,7 +18976,7 @@
           <p:cNvPr id="185" name="TextBox 184">
             <a:extLst>
               <a:ext uri="{FF2B5EF4-FFF2-40B4-BE49-F238E27FC236}">
-                <a16:creationId xmlns="" xmlns:a16="http://schemas.microsoft.com/office/drawing/2014/main" id="{6CA324BF-9B14-466E-A81E-34C26CB27E64}"/>
+                <a16:creationId xmlns:a16="http://schemas.microsoft.com/office/drawing/2014/main" xmlns="" id="{6CA324BF-9B14-466E-A81E-34C26CB27E64}"/>
               </a:ext>
             </a:extLst>
           </p:cNvPr>
@@ -16483,7 +19016,7 @@
           <p:cNvPr id="186" name="Rectangle 185">
             <a:extLst>
               <a:ext uri="{FF2B5EF4-FFF2-40B4-BE49-F238E27FC236}">
-                <a16:creationId xmlns="" xmlns:a16="http://schemas.microsoft.com/office/drawing/2014/main" id="{0E9599B0-71F9-4F2B-B25D-F1B734DD4AD3}"/>
+                <a16:creationId xmlns:a16="http://schemas.microsoft.com/office/drawing/2014/main" xmlns="" id="{0E9599B0-71F9-4F2B-B25D-F1B734DD4AD3}"/>
               </a:ext>
             </a:extLst>
           </p:cNvPr>
@@ -16630,7 +19163,7 @@
           <p:cNvPr id="187" name="Left-Right Arrow 63">
             <a:extLst>
               <a:ext uri="{FF2B5EF4-FFF2-40B4-BE49-F238E27FC236}">
-                <a16:creationId xmlns="" xmlns:a16="http://schemas.microsoft.com/office/drawing/2014/main" id="{DB15937A-C17F-4579-A5C9-C19245AE3BFF}"/>
+                <a16:creationId xmlns:a16="http://schemas.microsoft.com/office/drawing/2014/main" xmlns="" id="{DB15937A-C17F-4579-A5C9-C19245AE3BFF}"/>
               </a:ext>
             </a:extLst>
           </p:cNvPr>
@@ -16780,7 +19313,7 @@
           <p:cNvPr id="25" name="TextBox 24">
             <a:extLst>
               <a:ext uri="{FF2B5EF4-FFF2-40B4-BE49-F238E27FC236}">
-                <a16:creationId xmlns="" xmlns:a16="http://schemas.microsoft.com/office/drawing/2014/main" id="{CA6BF9A4-44B4-4348-8998-40AEE6FD358D}"/>
+                <a16:creationId xmlns:a16="http://schemas.microsoft.com/office/drawing/2014/main" xmlns="" id="{CA6BF9A4-44B4-4348-8998-40AEE6FD358D}"/>
               </a:ext>
             </a:extLst>
           </p:cNvPr>
@@ -16973,7 +19506,7 @@
           <a:p>
             <a:fld id="{B11D738E-8962-435F-8C43-147B8DD7E819}" type="datetime1">
               <a:rPr lang="en-US" smtClean="0"/>
-              <a:t>7/22/2019</a:t>
+              <a:t>7/27/2019</a:t>
             </a:fld>
             <a:endParaRPr lang="en-US"/>
           </a:p>
@@ -17142,7 +19675,7 @@
           <a:p>
             <a:fld id="{B11D738E-8962-435F-8C43-147B8DD7E819}" type="datetime1">
               <a:rPr lang="en-US" smtClean="0"/>
-              <a:t>7/22/2019</a:t>
+              <a:t>7/27/2019</a:t>
             </a:fld>
             <a:endParaRPr lang="en-US"/>
           </a:p>
@@ -19837,7 +22370,7 @@
           <a:p>
             <a:fld id="{40BAADF0-1749-4E8B-9691-B44A5F8C0895}" type="datetime1">
               <a:rPr lang="en-US" smtClean="0"/>
-              <a:t>7/22/2019</a:t>
+              <a:t>7/27/2019</a:t>
             </a:fld>
             <a:endParaRPr lang="en-US"/>
           </a:p>
@@ -21757,7 +24290,7 @@
           <a:p>
             <a:fld id="{40BAADF0-1749-4E8B-9691-B44A5F8C0895}" type="datetime1">
               <a:rPr lang="en-US" smtClean="0"/>
-              <a:t>7/22/2019</a:t>
+              <a:t>7/27/2019</a:t>
             </a:fld>
             <a:endParaRPr lang="en-US"/>
           </a:p>
@@ -22549,7 +25082,7 @@
           <a:p>
             <a:fld id="{40BAADF0-1749-4E8B-9691-B44A5F8C0895}" type="datetime1">
               <a:rPr lang="en-US" smtClean="0"/>
-              <a:t>7/22/2019</a:t>
+              <a:t>7/27/2019</a:t>
             </a:fld>
             <a:endParaRPr lang="en-US"/>
           </a:p>
@@ -23323,7 +25856,7 @@
           <a:p>
             <a:fld id="{40BAADF0-1749-4E8B-9691-B44A5F8C0895}" type="datetime1">
               <a:rPr lang="en-US" smtClean="0"/>
-              <a:t>7/22/2019</a:t>
+              <a:t>7/27/2019</a:t>
             </a:fld>
             <a:endParaRPr lang="en-US"/>
           </a:p>
@@ -23544,7 +26077,7 @@
           <a:p>
             <a:fld id="{40BAADF0-1749-4E8B-9691-B44A5F8C0895}" type="datetime1">
               <a:rPr lang="en-US" smtClean="0"/>
-              <a:t>7/22/2019</a:t>
+              <a:t>7/27/2019</a:t>
             </a:fld>
             <a:endParaRPr lang="en-US"/>
           </a:p>

</xml_diff>